<commit_message>
update `Map vs Bind`
</commit_message>
<xml_diff>
--- a/FP.pptx
+++ b/FP.pptx
@@ -6,7 +6,7 @@
   </p:sldMasterIdLst>
   <p:sldIdLst>
     <p:sldId id="257" r:id="rId2"/>
-    <p:sldId id="256" r:id="rId3"/>
+    <p:sldId id="258" r:id="rId3"/>
   </p:sldIdLst>
   <p:sldSz cx="12192000" cy="6858000"/>
   <p:notesSz cx="6858000" cy="9144000"/>
@@ -244,7 +244,7 @@
           <a:p>
             <a:fld id="{70BF8FA9-73A0-4DC2-8E55-544D0BD59538}" type="datetimeFigureOut">
               <a:rPr lang="ko-KR" altLang="en-US" smtClean="0"/>
-              <a:t>2020-06-11</a:t>
+              <a:t>2020-06-17</a:t>
             </a:fld>
             <a:endParaRPr lang="ko-KR" altLang="en-US"/>
           </a:p>
@@ -414,7 +414,7 @@
           <a:p>
             <a:fld id="{70BF8FA9-73A0-4DC2-8E55-544D0BD59538}" type="datetimeFigureOut">
               <a:rPr lang="ko-KR" altLang="en-US" smtClean="0"/>
-              <a:t>2020-06-11</a:t>
+              <a:t>2020-06-17</a:t>
             </a:fld>
             <a:endParaRPr lang="ko-KR" altLang="en-US"/>
           </a:p>
@@ -594,7 +594,7 @@
           <a:p>
             <a:fld id="{70BF8FA9-73A0-4DC2-8E55-544D0BD59538}" type="datetimeFigureOut">
               <a:rPr lang="ko-KR" altLang="en-US" smtClean="0"/>
-              <a:t>2020-06-11</a:t>
+              <a:t>2020-06-17</a:t>
             </a:fld>
             <a:endParaRPr lang="ko-KR" altLang="en-US"/>
           </a:p>
@@ -764,7 +764,7 @@
           <a:p>
             <a:fld id="{70BF8FA9-73A0-4DC2-8E55-544D0BD59538}" type="datetimeFigureOut">
               <a:rPr lang="ko-KR" altLang="en-US" smtClean="0"/>
-              <a:t>2020-06-11</a:t>
+              <a:t>2020-06-17</a:t>
             </a:fld>
             <a:endParaRPr lang="ko-KR" altLang="en-US"/>
           </a:p>
@@ -1010,7 +1010,7 @@
           <a:p>
             <a:fld id="{70BF8FA9-73A0-4DC2-8E55-544D0BD59538}" type="datetimeFigureOut">
               <a:rPr lang="ko-KR" altLang="en-US" smtClean="0"/>
-              <a:t>2020-06-11</a:t>
+              <a:t>2020-06-17</a:t>
             </a:fld>
             <a:endParaRPr lang="ko-KR" altLang="en-US"/>
           </a:p>
@@ -1242,7 +1242,7 @@
           <a:p>
             <a:fld id="{70BF8FA9-73A0-4DC2-8E55-544D0BD59538}" type="datetimeFigureOut">
               <a:rPr lang="ko-KR" altLang="en-US" smtClean="0"/>
-              <a:t>2020-06-11</a:t>
+              <a:t>2020-06-17</a:t>
             </a:fld>
             <a:endParaRPr lang="ko-KR" altLang="en-US"/>
           </a:p>
@@ -1609,7 +1609,7 @@
           <a:p>
             <a:fld id="{70BF8FA9-73A0-4DC2-8E55-544D0BD59538}" type="datetimeFigureOut">
               <a:rPr lang="ko-KR" altLang="en-US" smtClean="0"/>
-              <a:t>2020-06-11</a:t>
+              <a:t>2020-06-17</a:t>
             </a:fld>
             <a:endParaRPr lang="ko-KR" altLang="en-US"/>
           </a:p>
@@ -1727,7 +1727,7 @@
           <a:p>
             <a:fld id="{70BF8FA9-73A0-4DC2-8E55-544D0BD59538}" type="datetimeFigureOut">
               <a:rPr lang="ko-KR" altLang="en-US" smtClean="0"/>
-              <a:t>2020-06-11</a:t>
+              <a:t>2020-06-17</a:t>
             </a:fld>
             <a:endParaRPr lang="ko-KR" altLang="en-US"/>
           </a:p>
@@ -1822,7 +1822,7 @@
           <a:p>
             <a:fld id="{70BF8FA9-73A0-4DC2-8E55-544D0BD59538}" type="datetimeFigureOut">
               <a:rPr lang="ko-KR" altLang="en-US" smtClean="0"/>
-              <a:t>2020-06-11</a:t>
+              <a:t>2020-06-17</a:t>
             </a:fld>
             <a:endParaRPr lang="ko-KR" altLang="en-US"/>
           </a:p>
@@ -2099,7 +2099,7 @@
           <a:p>
             <a:fld id="{70BF8FA9-73A0-4DC2-8E55-544D0BD59538}" type="datetimeFigureOut">
               <a:rPr lang="ko-KR" altLang="en-US" smtClean="0"/>
-              <a:t>2020-06-11</a:t>
+              <a:t>2020-06-17</a:t>
             </a:fld>
             <a:endParaRPr lang="ko-KR" altLang="en-US"/>
           </a:p>
@@ -2352,7 +2352,7 @@
           <a:p>
             <a:fld id="{70BF8FA9-73A0-4DC2-8E55-544D0BD59538}" type="datetimeFigureOut">
               <a:rPr lang="ko-KR" altLang="en-US" smtClean="0"/>
-              <a:t>2020-06-11</a:t>
+              <a:t>2020-06-17</a:t>
             </a:fld>
             <a:endParaRPr lang="ko-KR" altLang="en-US"/>
           </a:p>
@@ -2565,7 +2565,7 @@
           <a:p>
             <a:fld id="{70BF8FA9-73A0-4DC2-8E55-544D0BD59538}" type="datetimeFigureOut">
               <a:rPr lang="ko-KR" altLang="en-US" smtClean="0"/>
-              <a:t>2020-06-11</a:t>
+              <a:t>2020-06-17</a:t>
             </a:fld>
             <a:endParaRPr lang="ko-KR" altLang="en-US"/>
           </a:p>
@@ -3363,14 +3363,14 @@
       </p:grpSpPr>
       <p:sp>
         <p:nvSpPr>
-          <p:cNvPr id="13" name="직사각형 12"/>
+          <p:cNvPr id="18" name="직사각형 17"/>
           <p:cNvSpPr/>
           <p:nvPr/>
         </p:nvSpPr>
         <p:spPr>
           <a:xfrm>
-            <a:off x="1121229" y="1711563"/>
-            <a:ext cx="4361858" cy="1141580"/>
+            <a:off x="441469" y="1893399"/>
+            <a:ext cx="1182285" cy="539552"/>
           </a:xfrm>
           <a:prstGeom prst="rect">
             <a:avLst/>
@@ -3378,51 +3378,6 @@
           <a:solidFill>
             <a:srgbClr val="FFF5D9"/>
           </a:solidFill>
-          <a:ln>
-            <a:solidFill>
-              <a:srgbClr val="FFF5D9"/>
-            </a:solidFill>
-          </a:ln>
-        </p:spPr>
-        <p:style>
-          <a:lnRef idx="2">
-            <a:schemeClr val="accent1">
-              <a:shade val="50000"/>
-            </a:schemeClr>
-          </a:lnRef>
-          <a:fillRef idx="1">
-            <a:schemeClr val="accent1"/>
-          </a:fillRef>
-          <a:effectRef idx="0">
-            <a:schemeClr val="accent1"/>
-          </a:effectRef>
-          <a:fontRef idx="minor">
-            <a:schemeClr val="lt1"/>
-          </a:fontRef>
-        </p:style>
-        <p:txBody>
-          <a:bodyPr rtlCol="0" anchor="ctr"/>
-          <a:lstStyle/>
-          <a:p>
-            <a:pPr algn="ctr"/>
-            <a:endParaRPr lang="ko-KR" altLang="en-US"/>
-          </a:p>
-        </p:txBody>
-      </p:sp>
-      <p:sp>
-        <p:nvSpPr>
-          <p:cNvPr id="4" name="직사각형 3"/>
-          <p:cNvSpPr/>
-          <p:nvPr/>
-        </p:nvSpPr>
-        <p:spPr>
-          <a:xfrm>
-            <a:off x="1572746" y="3262068"/>
-            <a:ext cx="1182285" cy="539552"/>
-          </a:xfrm>
-          <a:prstGeom prst="rect">
-            <a:avLst/>
-          </a:prstGeom>
           <a:ln w="28575">
             <a:solidFill>
               <a:srgbClr val="0070C0"/>
@@ -3449,12 +3404,12 @@
           <a:p>
             <a:pPr algn="ctr"/>
             <a:r>
-              <a:rPr lang="en-US" altLang="ko-KR" sz="1400" b="1" dirty="0" smtClean="0">
+              <a:rPr lang="en-US" altLang="ko-KR" sz="1400" b="1" smtClean="0">
                 <a:solidFill>
                   <a:srgbClr val="0070C0"/>
                 </a:solidFill>
               </a:rPr>
-              <a:t>Container</a:t>
+              <a:t>int</a:t>
             </a:r>
             <a:endParaRPr lang="ko-KR" altLang="en-US" sz="1400" b="1" dirty="0">
               <a:solidFill>
@@ -3466,18 +3421,21 @@
       </p:sp>
       <p:sp>
         <p:nvSpPr>
-          <p:cNvPr id="5" name="직사각형 4"/>
+          <p:cNvPr id="22" name="직사각형 21"/>
           <p:cNvSpPr/>
           <p:nvPr/>
         </p:nvSpPr>
         <p:spPr>
           <a:xfrm>
-            <a:off x="3849285" y="3262068"/>
+            <a:off x="4239076" y="1893399"/>
             <a:ext cx="1182285" cy="539552"/>
           </a:xfrm>
           <a:prstGeom prst="rect">
             <a:avLst/>
           </a:prstGeom>
+          <a:solidFill>
+            <a:srgbClr val="FFF5D9"/>
+          </a:solidFill>
           <a:ln w="28575">
             <a:solidFill>
               <a:srgbClr val="0070C0"/>
@@ -3504,12 +3462,12 @@
           <a:p>
             <a:pPr algn="ctr"/>
             <a:r>
-              <a:rPr lang="en-US" altLang="ko-KR" sz="1400" b="1" dirty="0" smtClean="0">
+              <a:rPr lang="en-US" altLang="ko-KR" sz="1400" b="1" smtClean="0">
                 <a:solidFill>
                   <a:srgbClr val="0070C0"/>
                 </a:solidFill>
               </a:rPr>
-              <a:t>Container</a:t>
+              <a:t>double</a:t>
             </a:r>
             <a:endParaRPr lang="ko-KR" altLang="en-US" sz="1400" b="1" dirty="0">
               <a:solidFill>
@@ -3519,142 +3477,270 @@
           </a:p>
         </p:txBody>
       </p:sp>
-      <p:sp>
-        <p:nvSpPr>
-          <p:cNvPr id="6" name="직사각형 5"/>
-          <p:cNvSpPr/>
+      <p:cxnSp>
+        <p:nvCxnSpPr>
+          <p:cNvPr id="26" name="직선 화살표 연결선 25"/>
+          <p:cNvCxnSpPr>
+            <a:stCxn id="21" idx="3"/>
+            <a:endCxn id="33" idx="1"/>
+          </p:cNvCxnSpPr>
           <p:nvPr/>
-        </p:nvSpPr>
+        </p:nvCxnSpPr>
         <p:spPr>
-          <a:xfrm>
-            <a:off x="1572746" y="2068426"/>
-            <a:ext cx="1182285" cy="539552"/>
+          <a:xfrm flipV="1">
+            <a:off x="2504434" y="2163174"/>
+            <a:ext cx="853962" cy="1"/>
           </a:xfrm>
-          <a:prstGeom prst="rect">
+          <a:prstGeom prst="straightConnector1">
             <a:avLst/>
           </a:prstGeom>
-          <a:solidFill>
-            <a:schemeClr val="bg1"/>
-          </a:solidFill>
-          <a:ln>
-            <a:solidFill>
-              <a:schemeClr val="bg1">
-                <a:lumMod val="85000"/>
-              </a:schemeClr>
-            </a:solidFill>
-            <a:prstDash val="lgDash"/>
+          <a:ln w="38100">
+            <a:tailEnd type="triangle"/>
           </a:ln>
         </p:spPr>
         <p:style>
-          <a:lnRef idx="2">
-            <a:schemeClr val="accent1">
-              <a:shade val="50000"/>
-            </a:schemeClr>
+          <a:lnRef idx="3">
+            <a:schemeClr val="dk1"/>
           </a:lnRef>
-          <a:fillRef idx="1">
-            <a:schemeClr val="accent1"/>
+          <a:fillRef idx="0">
+            <a:schemeClr val="dk1"/>
           </a:fillRef>
-          <a:effectRef idx="0">
-            <a:schemeClr val="accent1"/>
+          <a:effectRef idx="2">
+            <a:schemeClr val="dk1"/>
           </a:effectRef>
           <a:fontRef idx="minor">
-            <a:schemeClr val="lt1"/>
+            <a:schemeClr val="tx1"/>
           </a:fontRef>
         </p:style>
-        <p:txBody>
-          <a:bodyPr rtlCol="0" anchor="ctr"/>
-          <a:lstStyle/>
-          <a:p>
-            <a:pPr algn="ctr"/>
-            <a:r>
-              <a:rPr lang="en-US" altLang="ko-KR" sz="1400" b="1" dirty="0" err="1" smtClean="0">
+      </p:cxnSp>
+      <mc:AlternateContent xmlns:mc="http://schemas.openxmlformats.org/markup-compatibility/2006">
+        <mc:Choice xmlns:a14="http://schemas.microsoft.com/office/drawing/2010/main" Requires="a14">
+          <p:sp>
+            <p:nvSpPr>
+              <p:cNvPr id="27" name="TextBox 26"/>
+              <p:cNvSpPr txBox="1"/>
+              <p:nvPr/>
+            </p:nvSpPr>
+            <p:spPr>
+              <a:xfrm>
+                <a:off x="2779759" y="1633194"/>
+                <a:ext cx="328615" cy="430887"/>
+              </a:xfrm>
+              <a:prstGeom prst="rect">
+                <a:avLst/>
+              </a:prstGeom>
+              <a:noFill/>
+            </p:spPr>
+            <p:txBody>
+              <a:bodyPr wrap="none" lIns="0" tIns="0" rIns="0" bIns="0" rtlCol="0">
+                <a:spAutoFit/>
+              </a:bodyPr>
+              <a:lstStyle/>
+              <a:p>
+                <a14:m>
+                  <m:oMathPara xmlns:m="http://schemas.openxmlformats.org/officeDocument/2006/math">
+                    <m:oMathParaPr>
+                      <m:jc m:val="centerGroup"/>
+                    </m:oMathParaPr>
+                    <m:oMath xmlns:m="http://schemas.openxmlformats.org/officeDocument/2006/math">
+                      <m:r>
+                        <a:rPr lang="pt-BR" altLang="ko-KR" sz="2800" b="1" i="1" smtClean="0">
+                          <a:latin typeface="+mn-ea"/>
+                        </a:rPr>
+                        <m:t>𝒇</m:t>
+                      </m:r>
+                    </m:oMath>
+                  </m:oMathPara>
+                </a14:m>
+                <a:endParaRPr lang="ko-KR" altLang="en-US" sz="2800" b="1">
+                  <a:latin typeface="+mn-ea"/>
+                </a:endParaRPr>
+              </a:p>
+            </p:txBody>
+          </p:sp>
+        </mc:Choice>
+        <mc:Fallback>
+          <p:sp>
+            <p:nvSpPr>
+              <p:cNvPr id="27" name="TextBox 26"/>
+              <p:cNvSpPr txBox="1">
+                <a:spLocks noRot="1" noChangeAspect="1" noMove="1" noResize="1" noEditPoints="1" noAdjustHandles="1" noChangeArrowheads="1" noChangeShapeType="1" noTextEdit="1"/>
+              </p:cNvSpPr>
+              <p:nvPr/>
+            </p:nvSpPr>
+            <p:spPr>
+              <a:xfrm>
+                <a:off x="2779759" y="1633194"/>
+                <a:ext cx="328615" cy="430887"/>
+              </a:xfrm>
+              <a:prstGeom prst="rect">
+                <a:avLst/>
+              </a:prstGeom>
+              <a:blipFill rotWithShape="0">
+                <a:blip r:embed="rId2"/>
+                <a:stretch>
+                  <a:fillRect/>
+                </a:stretch>
+              </a:blipFill>
+            </p:spPr>
+            <p:txBody>
+              <a:bodyPr/>
+              <a:lstStyle/>
+              <a:p>
+                <a:r>
+                  <a:rPr lang="ko-KR" altLang="en-US">
+                    <a:noFill/>
+                  </a:rPr>
+                  <a:t> </a:t>
+                </a:r>
+              </a:p>
+            </p:txBody>
+          </p:sp>
+        </mc:Fallback>
+      </mc:AlternateContent>
+      <p:grpSp>
+        <p:nvGrpSpPr>
+          <p:cNvPr id="56" name="그룹 55"/>
+          <p:cNvGrpSpPr/>
+          <p:nvPr/>
+        </p:nvGrpSpPr>
+        <p:grpSpPr>
+          <a:xfrm>
+            <a:off x="1740068" y="1964989"/>
+            <a:ext cx="2382694" cy="396370"/>
+            <a:chOff x="1740068" y="3486058"/>
+            <a:chExt cx="2382694" cy="396370"/>
+          </a:xfrm>
+        </p:grpSpPr>
+        <p:sp>
+          <p:nvSpPr>
+            <p:cNvPr id="21" name="직사각형 20"/>
+            <p:cNvSpPr/>
+            <p:nvPr/>
+          </p:nvSpPr>
+          <p:spPr>
+            <a:xfrm>
+              <a:off x="1740068" y="3486059"/>
+              <a:ext cx="764366" cy="396369"/>
+            </a:xfrm>
+            <a:prstGeom prst="rect">
+              <a:avLst/>
+            </a:prstGeom>
+            <a:solidFill>
+              <a:schemeClr val="bg1"/>
+            </a:solidFill>
+            <a:ln w="12700">
+              <a:solidFill>
+                <a:schemeClr val="bg2"/>
+              </a:solidFill>
+              <a:prstDash val="dash"/>
+            </a:ln>
+          </p:spPr>
+          <p:style>
+            <a:lnRef idx="2">
+              <a:schemeClr val="dk1"/>
+            </a:lnRef>
+            <a:fillRef idx="1">
+              <a:schemeClr val="lt1"/>
+            </a:fillRef>
+            <a:effectRef idx="0">
+              <a:schemeClr val="dk1"/>
+            </a:effectRef>
+            <a:fontRef idx="minor">
+              <a:schemeClr val="dk1"/>
+            </a:fontRef>
+          </p:style>
+          <p:txBody>
+            <a:bodyPr rtlCol="0" anchor="ctr"/>
+            <a:lstStyle/>
+            <a:p>
+              <a:pPr algn="ctr"/>
+              <a:r>
+                <a:rPr lang="en-US" altLang="ko-KR" sz="1100" b="1" smtClean="0">
+                  <a:solidFill>
+                    <a:srgbClr val="0070C0"/>
+                  </a:solidFill>
+                </a:rPr>
+                <a:t>int</a:t>
+              </a:r>
+              <a:endParaRPr lang="ko-KR" altLang="en-US" sz="1100" b="1" dirty="0">
                 <a:solidFill>
-                  <a:schemeClr val="tx1"/>
+                  <a:srgbClr val="0070C0"/>
                 </a:solidFill>
-              </a:rPr>
-              <a:t>int</a:t>
-            </a:r>
-            <a:endParaRPr lang="ko-KR" altLang="en-US" sz="1400" b="1" dirty="0">
+              </a:endParaRPr>
+            </a:p>
+          </p:txBody>
+        </p:sp>
+        <p:sp>
+          <p:nvSpPr>
+            <p:cNvPr id="33" name="직사각형 32"/>
+            <p:cNvSpPr/>
+            <p:nvPr/>
+          </p:nvSpPr>
+          <p:spPr>
+            <a:xfrm>
+              <a:off x="3358396" y="3486058"/>
+              <a:ext cx="764366" cy="396369"/>
+            </a:xfrm>
+            <a:prstGeom prst="rect">
+              <a:avLst/>
+            </a:prstGeom>
+            <a:solidFill>
+              <a:schemeClr val="bg1"/>
+            </a:solidFill>
+            <a:ln w="12700">
               <a:solidFill>
-                <a:schemeClr val="tx1"/>
+                <a:schemeClr val="bg2"/>
               </a:solidFill>
-            </a:endParaRPr>
-          </a:p>
-        </p:txBody>
-      </p:sp>
-      <p:sp>
-        <p:nvSpPr>
-          <p:cNvPr id="7" name="직사각형 6"/>
+              <a:prstDash val="dash"/>
+            </a:ln>
+          </p:spPr>
+          <p:style>
+            <a:lnRef idx="2">
+              <a:schemeClr val="dk1"/>
+            </a:lnRef>
+            <a:fillRef idx="1">
+              <a:schemeClr val="lt1"/>
+            </a:fillRef>
+            <a:effectRef idx="0">
+              <a:schemeClr val="dk1"/>
+            </a:effectRef>
+            <a:fontRef idx="minor">
+              <a:schemeClr val="dk1"/>
+            </a:fontRef>
+          </p:style>
+          <p:txBody>
+            <a:bodyPr rtlCol="0" anchor="ctr"/>
+            <a:lstStyle/>
+            <a:p>
+              <a:pPr algn="ctr"/>
+              <a:r>
+                <a:rPr lang="en-US" altLang="ko-KR" sz="1100" b="1" smtClean="0">
+                  <a:solidFill>
+                    <a:srgbClr val="0070C0"/>
+                  </a:solidFill>
+                </a:rPr>
+                <a:t>double</a:t>
+              </a:r>
+              <a:endParaRPr lang="ko-KR" altLang="en-US" sz="1100" b="1" dirty="0">
+                <a:solidFill>
+                  <a:srgbClr val="0070C0"/>
+                </a:solidFill>
+              </a:endParaRPr>
+            </a:p>
+          </p:txBody>
+        </p:sp>
+      </p:grpSp>
+      <p:sp>
+        <p:nvSpPr>
+          <p:cNvPr id="37" name="위쪽 화살표 36"/>
           <p:cNvSpPr/>
           <p:nvPr/>
         </p:nvSpPr>
         <p:spPr>
-          <a:xfrm>
-            <a:off x="3849285" y="2068426"/>
-            <a:ext cx="1182285" cy="539552"/>
-          </a:xfrm>
-          <a:prstGeom prst="rect">
-            <a:avLst/>
-          </a:prstGeom>
-          <a:solidFill>
-            <a:schemeClr val="bg1"/>
-          </a:solidFill>
-          <a:ln>
-            <a:solidFill>
-              <a:schemeClr val="bg1">
-                <a:lumMod val="85000"/>
-              </a:schemeClr>
-            </a:solidFill>
-            <a:prstDash val="lgDash"/>
-          </a:ln>
-        </p:spPr>
-        <p:style>
-          <a:lnRef idx="2">
-            <a:schemeClr val="accent1">
-              <a:shade val="50000"/>
-            </a:schemeClr>
-          </a:lnRef>
-          <a:fillRef idx="1">
-            <a:schemeClr val="accent1"/>
-          </a:fillRef>
-          <a:effectRef idx="0">
-            <a:schemeClr val="accent1"/>
-          </a:effectRef>
-          <a:fontRef idx="minor">
-            <a:schemeClr val="lt1"/>
-          </a:fontRef>
-        </p:style>
-        <p:txBody>
-          <a:bodyPr rtlCol="0" anchor="ctr"/>
-          <a:lstStyle/>
-          <a:p>
-            <a:pPr algn="ctr"/>
-            <a:r>
-              <a:rPr lang="en-US" altLang="ko-KR" sz="1400" b="1" dirty="0" smtClean="0">
-                <a:solidFill>
-                  <a:schemeClr val="tx1"/>
-                </a:solidFill>
-              </a:rPr>
-              <a:t>double</a:t>
-            </a:r>
-            <a:endParaRPr lang="ko-KR" altLang="en-US" sz="1400" b="1" dirty="0">
-              <a:solidFill>
-                <a:schemeClr val="tx1"/>
-              </a:solidFill>
-            </a:endParaRPr>
-          </a:p>
-        </p:txBody>
-      </p:sp>
-      <p:sp>
-        <p:nvSpPr>
-          <p:cNvPr id="8" name="위쪽 화살표 7"/>
-          <p:cNvSpPr/>
-          <p:nvPr/>
-        </p:nvSpPr>
-        <p:spPr>
-          <a:xfrm>
-            <a:off x="1913989" y="2483976"/>
-            <a:ext cx="499797" cy="903042"/>
+          <a:xfrm rot="5400000">
+            <a:off x="4003511" y="1984043"/>
+            <a:ext cx="339616" cy="353499"/>
           </a:xfrm>
           <a:prstGeom prst="upArrow">
             <a:avLst>
@@ -3698,14 +3784,350 @@
       </p:sp>
       <p:sp>
         <p:nvSpPr>
-          <p:cNvPr id="9" name="위쪽 화살표 8"/>
+          <p:cNvPr id="39" name="TextBox 38"/>
+          <p:cNvSpPr txBox="1"/>
+          <p:nvPr/>
+        </p:nvSpPr>
+        <p:spPr>
+          <a:xfrm>
+            <a:off x="550127" y="2458944"/>
+            <a:ext cx="1015021" cy="307777"/>
+          </a:xfrm>
+          <a:prstGeom prst="rect">
+            <a:avLst/>
+          </a:prstGeom>
+          <a:noFill/>
+        </p:spPr>
+        <p:txBody>
+          <a:bodyPr wrap="none" rtlCol="0">
+            <a:spAutoFit/>
+          </a:bodyPr>
+          <a:lstStyle/>
+          <a:p>
+            <a:r>
+              <a:rPr lang="en-US" altLang="ko-KR" sz="1400" b="1" smtClean="0">
+                <a:solidFill>
+                  <a:srgbClr val="0070C0"/>
+                </a:solidFill>
+              </a:rPr>
+              <a:t>Container</a:t>
+            </a:r>
+            <a:endParaRPr lang="ko-KR" altLang="en-US" sz="1400" b="1">
+              <a:solidFill>
+                <a:srgbClr val="0070C0"/>
+              </a:solidFill>
+            </a:endParaRPr>
+          </a:p>
+        </p:txBody>
+      </p:sp>
+      <p:sp>
+        <p:nvSpPr>
+          <p:cNvPr id="41" name="TextBox 40"/>
+          <p:cNvSpPr txBox="1"/>
+          <p:nvPr/>
+        </p:nvSpPr>
+        <p:spPr>
+          <a:xfrm>
+            <a:off x="4322708" y="2458944"/>
+            <a:ext cx="1015021" cy="307777"/>
+          </a:xfrm>
+          <a:prstGeom prst="rect">
+            <a:avLst/>
+          </a:prstGeom>
+          <a:noFill/>
+        </p:spPr>
+        <p:txBody>
+          <a:bodyPr wrap="none" rtlCol="0">
+            <a:spAutoFit/>
+          </a:bodyPr>
+          <a:lstStyle/>
+          <a:p>
+            <a:r>
+              <a:rPr lang="en-US" altLang="ko-KR" sz="1400" b="1" smtClean="0">
+                <a:solidFill>
+                  <a:srgbClr val="0070C0"/>
+                </a:solidFill>
+              </a:rPr>
+              <a:t>Container</a:t>
+            </a:r>
+            <a:endParaRPr lang="ko-KR" altLang="en-US" sz="1400" b="1">
+              <a:solidFill>
+                <a:srgbClr val="0070C0"/>
+              </a:solidFill>
+            </a:endParaRPr>
+          </a:p>
+        </p:txBody>
+      </p:sp>
+      <p:sp>
+        <p:nvSpPr>
+          <p:cNvPr id="44" name="직사각형 43"/>
           <p:cNvSpPr/>
           <p:nvPr/>
         </p:nvSpPr>
         <p:spPr>
-          <a:xfrm rot="10800000">
-            <a:off x="4190527" y="2483976"/>
-            <a:ext cx="499797" cy="903042"/>
+          <a:xfrm>
+            <a:off x="7056215" y="1854232"/>
+            <a:ext cx="1182285" cy="539552"/>
+          </a:xfrm>
+          <a:prstGeom prst="rect">
+            <a:avLst/>
+          </a:prstGeom>
+          <a:solidFill>
+            <a:srgbClr val="FFF5D9"/>
+          </a:solidFill>
+          <a:ln w="28575">
+            <a:solidFill>
+              <a:srgbClr val="0070C0"/>
+            </a:solidFill>
+          </a:ln>
+        </p:spPr>
+        <p:style>
+          <a:lnRef idx="2">
+            <a:schemeClr val="dk1"/>
+          </a:lnRef>
+          <a:fillRef idx="1">
+            <a:schemeClr val="lt1"/>
+          </a:fillRef>
+          <a:effectRef idx="0">
+            <a:schemeClr val="dk1"/>
+          </a:effectRef>
+          <a:fontRef idx="minor">
+            <a:schemeClr val="dk1"/>
+          </a:fontRef>
+        </p:style>
+        <p:txBody>
+          <a:bodyPr rtlCol="0" anchor="ctr"/>
+          <a:lstStyle/>
+          <a:p>
+            <a:pPr algn="ctr"/>
+            <a:r>
+              <a:rPr lang="en-US" altLang="ko-KR" sz="1400" b="1" smtClean="0">
+                <a:solidFill>
+                  <a:srgbClr val="0070C0"/>
+                </a:solidFill>
+              </a:rPr>
+              <a:t>int</a:t>
+            </a:r>
+            <a:endParaRPr lang="ko-KR" altLang="en-US" sz="1400" b="1" dirty="0">
+              <a:solidFill>
+                <a:srgbClr val="0070C0"/>
+              </a:solidFill>
+            </a:endParaRPr>
+          </a:p>
+        </p:txBody>
+      </p:sp>
+      <p:sp>
+        <p:nvSpPr>
+          <p:cNvPr id="45" name="직사각형 44"/>
+          <p:cNvSpPr/>
+          <p:nvPr/>
+        </p:nvSpPr>
+        <p:spPr>
+          <a:xfrm>
+            <a:off x="8354814" y="1925823"/>
+            <a:ext cx="764366" cy="396369"/>
+          </a:xfrm>
+          <a:prstGeom prst="rect">
+            <a:avLst/>
+          </a:prstGeom>
+          <a:solidFill>
+            <a:schemeClr val="bg1"/>
+          </a:solidFill>
+          <a:ln w="12700">
+            <a:solidFill>
+              <a:schemeClr val="bg2"/>
+            </a:solidFill>
+            <a:prstDash val="dash"/>
+          </a:ln>
+        </p:spPr>
+        <p:style>
+          <a:lnRef idx="2">
+            <a:schemeClr val="dk1"/>
+          </a:lnRef>
+          <a:fillRef idx="1">
+            <a:schemeClr val="lt1"/>
+          </a:fillRef>
+          <a:effectRef idx="0">
+            <a:schemeClr val="dk1"/>
+          </a:effectRef>
+          <a:fontRef idx="minor">
+            <a:schemeClr val="dk1"/>
+          </a:fontRef>
+        </p:style>
+        <p:txBody>
+          <a:bodyPr rtlCol="0" anchor="ctr"/>
+          <a:lstStyle/>
+          <a:p>
+            <a:pPr algn="ctr"/>
+            <a:r>
+              <a:rPr lang="en-US" altLang="ko-KR" sz="1100" b="1" smtClean="0">
+                <a:solidFill>
+                  <a:srgbClr val="0070C0"/>
+                </a:solidFill>
+              </a:rPr>
+              <a:t>int</a:t>
+            </a:r>
+            <a:endParaRPr lang="ko-KR" altLang="en-US" sz="1100" b="1" dirty="0">
+              <a:solidFill>
+                <a:srgbClr val="0070C0"/>
+              </a:solidFill>
+            </a:endParaRPr>
+          </a:p>
+        </p:txBody>
+      </p:sp>
+      <p:sp>
+        <p:nvSpPr>
+          <p:cNvPr id="46" name="직사각형 45"/>
+          <p:cNvSpPr/>
+          <p:nvPr/>
+        </p:nvSpPr>
+        <p:spPr>
+          <a:xfrm>
+            <a:off x="9967026" y="1854232"/>
+            <a:ext cx="1182285" cy="539552"/>
+          </a:xfrm>
+          <a:prstGeom prst="rect">
+            <a:avLst/>
+          </a:prstGeom>
+          <a:solidFill>
+            <a:srgbClr val="FFF5D9"/>
+          </a:solidFill>
+          <a:ln w="28575">
+            <a:solidFill>
+              <a:srgbClr val="0070C0"/>
+            </a:solidFill>
+          </a:ln>
+        </p:spPr>
+        <p:style>
+          <a:lnRef idx="2">
+            <a:schemeClr val="dk1"/>
+          </a:lnRef>
+          <a:fillRef idx="1">
+            <a:schemeClr val="lt1"/>
+          </a:fillRef>
+          <a:effectRef idx="0">
+            <a:schemeClr val="dk1"/>
+          </a:effectRef>
+          <a:fontRef idx="minor">
+            <a:schemeClr val="dk1"/>
+          </a:fontRef>
+        </p:style>
+        <p:txBody>
+          <a:bodyPr rtlCol="0" anchor="ctr"/>
+          <a:lstStyle/>
+          <a:p>
+            <a:pPr algn="ctr"/>
+            <a:r>
+              <a:rPr lang="en-US" altLang="ko-KR" sz="1400" b="1" smtClean="0">
+                <a:solidFill>
+                  <a:srgbClr val="0070C0"/>
+                </a:solidFill>
+              </a:rPr>
+              <a:t>double</a:t>
+            </a:r>
+            <a:endParaRPr lang="ko-KR" altLang="en-US" sz="1400" b="1" dirty="0">
+              <a:solidFill>
+                <a:srgbClr val="0070C0"/>
+              </a:solidFill>
+            </a:endParaRPr>
+          </a:p>
+        </p:txBody>
+      </p:sp>
+      <mc:AlternateContent xmlns:mc="http://schemas.openxmlformats.org/markup-compatibility/2006">
+        <mc:Choice xmlns:a14="http://schemas.microsoft.com/office/drawing/2010/main" Requires="a14">
+          <p:sp>
+            <p:nvSpPr>
+              <p:cNvPr id="48" name="TextBox 47"/>
+              <p:cNvSpPr txBox="1"/>
+              <p:nvPr/>
+            </p:nvSpPr>
+            <p:spPr>
+              <a:xfrm>
+                <a:off x="9394505" y="1594027"/>
+                <a:ext cx="328615" cy="430887"/>
+              </a:xfrm>
+              <a:prstGeom prst="rect">
+                <a:avLst/>
+              </a:prstGeom>
+              <a:noFill/>
+            </p:spPr>
+            <p:txBody>
+              <a:bodyPr wrap="none" lIns="0" tIns="0" rIns="0" bIns="0" rtlCol="0">
+                <a:spAutoFit/>
+              </a:bodyPr>
+              <a:lstStyle/>
+              <a:p>
+                <a14:m>
+                  <m:oMathPara xmlns:m="http://schemas.openxmlformats.org/officeDocument/2006/math">
+                    <m:oMathParaPr>
+                      <m:jc m:val="centerGroup"/>
+                    </m:oMathParaPr>
+                    <m:oMath xmlns:m="http://schemas.openxmlformats.org/officeDocument/2006/math">
+                      <m:r>
+                        <a:rPr lang="pt-BR" altLang="ko-KR" sz="2800" b="1" i="1" smtClean="0">
+                          <a:latin typeface="+mn-ea"/>
+                        </a:rPr>
+                        <m:t>𝒇</m:t>
+                      </m:r>
+                    </m:oMath>
+                  </m:oMathPara>
+                </a14:m>
+                <a:endParaRPr lang="ko-KR" altLang="en-US" sz="2800" b="1">
+                  <a:latin typeface="+mn-ea"/>
+                </a:endParaRPr>
+              </a:p>
+            </p:txBody>
+          </p:sp>
+        </mc:Choice>
+        <mc:Fallback>
+          <p:sp>
+            <p:nvSpPr>
+              <p:cNvPr id="48" name="TextBox 47"/>
+              <p:cNvSpPr txBox="1">
+                <a:spLocks noRot="1" noChangeAspect="1" noMove="1" noResize="1" noEditPoints="1" noAdjustHandles="1" noChangeArrowheads="1" noChangeShapeType="1" noTextEdit="1"/>
+              </p:cNvSpPr>
+              <p:nvPr/>
+            </p:nvSpPr>
+            <p:spPr>
+              <a:xfrm>
+                <a:off x="9394505" y="1594027"/>
+                <a:ext cx="328615" cy="430887"/>
+              </a:xfrm>
+              <a:prstGeom prst="rect">
+                <a:avLst/>
+              </a:prstGeom>
+              <a:blipFill rotWithShape="0">
+                <a:blip r:embed="rId3"/>
+                <a:stretch>
+                  <a:fillRect/>
+                </a:stretch>
+              </a:blipFill>
+            </p:spPr>
+            <p:txBody>
+              <a:bodyPr/>
+              <a:lstStyle/>
+              <a:p>
+                <a:r>
+                  <a:rPr lang="ko-KR" altLang="en-US">
+                    <a:noFill/>
+                  </a:rPr>
+                  <a:t> </a:t>
+                </a:r>
+              </a:p>
+            </p:txBody>
+          </p:sp>
+        </mc:Fallback>
+      </mc:AlternateContent>
+      <p:sp>
+        <p:nvSpPr>
+          <p:cNvPr id="49" name="위쪽 화살표 48"/>
+          <p:cNvSpPr/>
+          <p:nvPr/>
+        </p:nvSpPr>
+        <p:spPr>
+          <a:xfrm rot="5400000">
+            <a:off x="8119374" y="1944875"/>
+            <a:ext cx="339616" cy="353499"/>
           </a:xfrm>
           <a:prstGeom prst="upArrow">
             <a:avLst>
@@ -3747,19 +4169,95 @@
           </a:p>
         </p:txBody>
       </p:sp>
+      <p:sp>
+        <p:nvSpPr>
+          <p:cNvPr id="52" name="TextBox 51"/>
+          <p:cNvSpPr txBox="1"/>
+          <p:nvPr/>
+        </p:nvSpPr>
+        <p:spPr>
+          <a:xfrm>
+            <a:off x="7164873" y="2419777"/>
+            <a:ext cx="1015021" cy="307777"/>
+          </a:xfrm>
+          <a:prstGeom prst="rect">
+            <a:avLst/>
+          </a:prstGeom>
+          <a:noFill/>
+        </p:spPr>
+        <p:txBody>
+          <a:bodyPr wrap="none" rtlCol="0">
+            <a:spAutoFit/>
+          </a:bodyPr>
+          <a:lstStyle/>
+          <a:p>
+            <a:r>
+              <a:rPr lang="en-US" altLang="ko-KR" sz="1400" b="1" smtClean="0">
+                <a:solidFill>
+                  <a:srgbClr val="0070C0"/>
+                </a:solidFill>
+              </a:rPr>
+              <a:t>Container</a:t>
+            </a:r>
+            <a:endParaRPr lang="ko-KR" altLang="en-US" sz="1400" b="1">
+              <a:solidFill>
+                <a:srgbClr val="0070C0"/>
+              </a:solidFill>
+            </a:endParaRPr>
+          </a:p>
+        </p:txBody>
+      </p:sp>
+      <p:sp>
+        <p:nvSpPr>
+          <p:cNvPr id="53" name="TextBox 52"/>
+          <p:cNvSpPr txBox="1"/>
+          <p:nvPr/>
+        </p:nvSpPr>
+        <p:spPr>
+          <a:xfrm>
+            <a:off x="10050658" y="2419777"/>
+            <a:ext cx="1015021" cy="307777"/>
+          </a:xfrm>
+          <a:prstGeom prst="rect">
+            <a:avLst/>
+          </a:prstGeom>
+          <a:noFill/>
+        </p:spPr>
+        <p:txBody>
+          <a:bodyPr wrap="none" rtlCol="0">
+            <a:spAutoFit/>
+          </a:bodyPr>
+          <a:lstStyle/>
+          <a:p>
+            <a:r>
+              <a:rPr lang="en-US" altLang="ko-KR" sz="1400" b="1" smtClean="0">
+                <a:solidFill>
+                  <a:srgbClr val="0070C0"/>
+                </a:solidFill>
+              </a:rPr>
+              <a:t>Container</a:t>
+            </a:r>
+            <a:endParaRPr lang="ko-KR" altLang="en-US" sz="1400" b="1">
+              <a:solidFill>
+                <a:srgbClr val="0070C0"/>
+              </a:solidFill>
+            </a:endParaRPr>
+          </a:p>
+        </p:txBody>
+      </p:sp>
       <p:cxnSp>
         <p:nvCxnSpPr>
-          <p:cNvPr id="11" name="직선 화살표 연결선 10"/>
+          <p:cNvPr id="47" name="직선 화살표 연결선 46"/>
           <p:cNvCxnSpPr>
-            <a:stCxn id="6" idx="3"/>
-            <a:endCxn id="7" idx="1"/>
+            <a:stCxn id="45" idx="3"/>
+            <a:endCxn id="46" idx="1"/>
           </p:cNvCxnSpPr>
           <p:nvPr/>
         </p:nvCxnSpPr>
         <p:spPr>
           <a:xfrm>
-            <a:off x="2755031" y="2338202"/>
-            <a:ext cx="1094254" cy="0"/>
+            <a:off x="9119180" y="2124008"/>
+            <a:ext cx="847846" cy="0"/>
           </a:xfrm>
           <a:prstGeom prst="straightConnector1">
             <a:avLst/>
@@ -3785,14 +4283,14 @@
       </p:cxnSp>
       <p:sp>
         <p:nvSpPr>
-          <p:cNvPr id="12" name="TextBox 11"/>
+          <p:cNvPr id="60" name="TextBox 59"/>
           <p:cNvSpPr txBox="1"/>
           <p:nvPr/>
         </p:nvSpPr>
         <p:spPr>
           <a:xfrm>
-            <a:off x="3152117" y="1837593"/>
-            <a:ext cx="300082" cy="461665"/>
+            <a:off x="6050147" y="2032370"/>
+            <a:ext cx="381836" cy="261610"/>
           </a:xfrm>
           <a:prstGeom prst="rect">
             <a:avLst/>
@@ -3806,381 +4304,91 @@
           <a:lstStyle/>
           <a:p>
             <a:r>
-              <a:rPr lang="en-US" altLang="ko-KR" sz="2400" b="1" dirty="0" smtClean="0"/>
-              <a:t>f</a:t>
-            </a:r>
-            <a:endParaRPr lang="ko-KR" altLang="en-US" sz="2400" b="1" dirty="0"/>
-          </a:p>
-        </p:txBody>
-      </p:sp>
-      <p:sp>
-        <p:nvSpPr>
-          <p:cNvPr id="27" name="타원 26"/>
-          <p:cNvSpPr/>
+              <a:rPr lang="en-US" altLang="ko-KR" sz="1100" b="1" i="1" smtClean="0">
+                <a:solidFill>
+                  <a:srgbClr val="C00000"/>
+                </a:solidFill>
+              </a:rPr>
+              <a:t>Vs.</a:t>
+            </a:r>
+            <a:endParaRPr lang="ko-KR" altLang="en-US" sz="1100" b="1" i="1">
+              <a:solidFill>
+                <a:srgbClr val="C00000"/>
+              </a:solidFill>
+            </a:endParaRPr>
+          </a:p>
+        </p:txBody>
+      </p:sp>
+      <p:sp>
+        <p:nvSpPr>
+          <p:cNvPr id="61" name="TextBox 60"/>
+          <p:cNvSpPr txBox="1"/>
           <p:nvPr/>
         </p:nvSpPr>
         <p:spPr>
           <a:xfrm>
-            <a:off x="1990662" y="3706962"/>
-            <a:ext cx="346449" cy="352129"/>
-          </a:xfrm>
-          <a:prstGeom prst="ellipse">
-            <a:avLst/>
-          </a:prstGeom>
-        </p:spPr>
-        <p:style>
-          <a:lnRef idx="1">
-            <a:schemeClr val="accent5"/>
-          </a:lnRef>
-          <a:fillRef idx="3">
-            <a:schemeClr val="accent5"/>
-          </a:fillRef>
-          <a:effectRef idx="2">
-            <a:schemeClr val="accent5"/>
-          </a:effectRef>
-          <a:fontRef idx="minor">
-            <a:schemeClr val="lt1"/>
-          </a:fontRef>
-        </p:style>
-        <p:txBody>
-          <a:bodyPr rtlCol="0" anchor="ctr"/>
-          <a:lstStyle/>
-          <a:p>
-            <a:pPr algn="ctr"/>
-            <a:r>
-              <a:rPr lang="en-US" altLang="ko-KR" sz="1200" b="1" dirty="0" smtClean="0"/>
-              <a:t>A</a:t>
-            </a:r>
-            <a:endParaRPr lang="ko-KR" altLang="en-US" sz="1200" b="1" dirty="0"/>
-          </a:p>
-        </p:txBody>
-      </p:sp>
-      <p:sp>
-        <p:nvSpPr>
-          <p:cNvPr id="28" name="타원 27"/>
-          <p:cNvSpPr/>
-          <p:nvPr/>
-        </p:nvSpPr>
-        <p:spPr>
-          <a:xfrm>
-            <a:off x="4267200" y="3706962"/>
-            <a:ext cx="346449" cy="352129"/>
-          </a:xfrm>
-          <a:prstGeom prst="ellipse">
-            <a:avLst/>
-          </a:prstGeom>
-        </p:spPr>
-        <p:style>
-          <a:lnRef idx="1">
-            <a:schemeClr val="accent5"/>
-          </a:lnRef>
-          <a:fillRef idx="3">
-            <a:schemeClr val="accent5"/>
-          </a:fillRef>
-          <a:effectRef idx="2">
-            <a:schemeClr val="accent5"/>
-          </a:effectRef>
-          <a:fontRef idx="minor">
-            <a:schemeClr val="lt1"/>
-          </a:fontRef>
-        </p:style>
-        <p:txBody>
-          <a:bodyPr rtlCol="0" anchor="ctr"/>
-          <a:lstStyle/>
-          <a:p>
-            <a:pPr algn="ctr"/>
-            <a:r>
-              <a:rPr lang="en-US" altLang="ko-KR" sz="1200" b="1" dirty="0" smtClean="0"/>
-              <a:t>A</a:t>
-            </a:r>
-            <a:endParaRPr lang="ko-KR" altLang="en-US" sz="1200" b="1" dirty="0"/>
-          </a:p>
-        </p:txBody>
-      </p:sp>
-      <p:sp>
-        <p:nvSpPr>
-          <p:cNvPr id="31" name="직사각형 30"/>
-          <p:cNvSpPr/>
-          <p:nvPr/>
-        </p:nvSpPr>
-        <p:spPr>
-          <a:xfrm>
-            <a:off x="6708914" y="1711563"/>
-            <a:ext cx="4361858" cy="1141580"/>
+            <a:off x="2511267" y="844531"/>
+            <a:ext cx="840295" cy="461665"/>
           </a:xfrm>
           <a:prstGeom prst="rect">
             <a:avLst/>
           </a:prstGeom>
-          <a:solidFill>
-            <a:srgbClr val="FFF5D9"/>
-          </a:solidFill>
-          <a:ln>
-            <a:solidFill>
-              <a:srgbClr val="FFF5D9"/>
-            </a:solidFill>
-          </a:ln>
+          <a:noFill/>
         </p:spPr>
-        <p:style>
-          <a:lnRef idx="2">
-            <a:schemeClr val="accent1">
-              <a:shade val="50000"/>
-            </a:schemeClr>
-          </a:lnRef>
-          <a:fillRef idx="1">
-            <a:schemeClr val="accent1"/>
-          </a:fillRef>
-          <a:effectRef idx="0">
-            <a:schemeClr val="accent1"/>
-          </a:effectRef>
-          <a:fontRef idx="minor">
-            <a:schemeClr val="lt1"/>
-          </a:fontRef>
-        </p:style>
-        <p:txBody>
-          <a:bodyPr rtlCol="0" anchor="ctr"/>
-          <a:lstStyle/>
-          <a:p>
-            <a:pPr algn="ctr"/>
-            <a:endParaRPr lang="ko-KR" altLang="en-US"/>
-          </a:p>
-        </p:txBody>
-      </p:sp>
-      <p:sp>
-        <p:nvSpPr>
-          <p:cNvPr id="32" name="직사각형 31"/>
-          <p:cNvSpPr/>
+        <p:txBody>
+          <a:bodyPr wrap="none" rtlCol="0">
+            <a:spAutoFit/>
+          </a:bodyPr>
+          <a:lstStyle/>
+          <a:p>
+            <a:r>
+              <a:rPr lang="en-US" altLang="ko-KR" sz="2400" b="1" smtClean="0"/>
+              <a:t>Map</a:t>
+            </a:r>
+            <a:endParaRPr lang="ko-KR" altLang="en-US" sz="2400" b="1"/>
+          </a:p>
+        </p:txBody>
+      </p:sp>
+      <p:sp>
+        <p:nvSpPr>
+          <p:cNvPr id="62" name="TextBox 61"/>
+          <p:cNvSpPr txBox="1"/>
           <p:nvPr/>
         </p:nvSpPr>
         <p:spPr>
           <a:xfrm>
-            <a:off x="7160431" y="3262068"/>
-            <a:ext cx="1182285" cy="539552"/>
+            <a:off x="9120551" y="844531"/>
+            <a:ext cx="845103" cy="461665"/>
           </a:xfrm>
           <a:prstGeom prst="rect">
             <a:avLst/>
           </a:prstGeom>
-          <a:ln w="28575">
-            <a:solidFill>
-              <a:srgbClr val="0070C0"/>
-            </a:solidFill>
-          </a:ln>
+          <a:noFill/>
         </p:spPr>
-        <p:style>
-          <a:lnRef idx="2">
-            <a:schemeClr val="dk1"/>
-          </a:lnRef>
-          <a:fillRef idx="1">
-            <a:schemeClr val="lt1"/>
-          </a:fillRef>
-          <a:effectRef idx="0">
-            <a:schemeClr val="dk1"/>
-          </a:effectRef>
-          <a:fontRef idx="minor">
-            <a:schemeClr val="dk1"/>
-          </a:fontRef>
-        </p:style>
-        <p:txBody>
-          <a:bodyPr rtlCol="0" anchor="ctr"/>
-          <a:lstStyle/>
-          <a:p>
-            <a:pPr algn="ctr"/>
-            <a:r>
-              <a:rPr lang="en-US" altLang="ko-KR" sz="1400" b="1" dirty="0" smtClean="0">
-                <a:solidFill>
-                  <a:srgbClr val="0070C0"/>
-                </a:solidFill>
-              </a:rPr>
-              <a:t>Container</a:t>
-            </a:r>
-            <a:endParaRPr lang="ko-KR" altLang="en-US" sz="1400" b="1" dirty="0">
-              <a:solidFill>
-                <a:srgbClr val="0070C0"/>
-              </a:solidFill>
-            </a:endParaRPr>
-          </a:p>
-        </p:txBody>
-      </p:sp>
-      <p:sp>
-        <p:nvSpPr>
-          <p:cNvPr id="33" name="직사각형 32"/>
+        <p:txBody>
+          <a:bodyPr wrap="none" rtlCol="0">
+            <a:spAutoFit/>
+          </a:bodyPr>
+          <a:lstStyle/>
+          <a:p>
+            <a:r>
+              <a:rPr lang="en-US" altLang="ko-KR" sz="2400" b="1" smtClean="0"/>
+              <a:t>Bind</a:t>
+            </a:r>
+            <a:endParaRPr lang="ko-KR" altLang="en-US" sz="2400" b="1"/>
+          </a:p>
+        </p:txBody>
+      </p:sp>
+      <p:sp>
+        <p:nvSpPr>
+          <p:cNvPr id="20" name="위쪽 화살표 19"/>
           <p:cNvSpPr/>
           <p:nvPr/>
         </p:nvSpPr>
         <p:spPr>
-          <a:xfrm>
-            <a:off x="9436970" y="3262068"/>
-            <a:ext cx="1182285" cy="539552"/>
-          </a:xfrm>
-          <a:prstGeom prst="rect">
-            <a:avLst/>
-          </a:prstGeom>
-          <a:ln w="28575">
-            <a:solidFill>
-              <a:schemeClr val="accent6"/>
-            </a:solidFill>
-          </a:ln>
-        </p:spPr>
-        <p:style>
-          <a:lnRef idx="2">
-            <a:schemeClr val="dk1"/>
-          </a:lnRef>
-          <a:fillRef idx="1">
-            <a:schemeClr val="lt1"/>
-          </a:fillRef>
-          <a:effectRef idx="0">
-            <a:schemeClr val="dk1"/>
-          </a:effectRef>
-          <a:fontRef idx="minor">
-            <a:schemeClr val="dk1"/>
-          </a:fontRef>
-        </p:style>
-        <p:txBody>
-          <a:bodyPr rtlCol="0" anchor="ctr"/>
-          <a:lstStyle/>
-          <a:p>
-            <a:pPr algn="ctr"/>
-            <a:r>
-              <a:rPr lang="en-US" altLang="ko-KR" sz="1400" b="1" dirty="0" smtClean="0"/>
-              <a:t>Container</a:t>
-            </a:r>
-            <a:endParaRPr lang="ko-KR" altLang="en-US" sz="1400" b="1" dirty="0"/>
-          </a:p>
-        </p:txBody>
-      </p:sp>
-      <p:sp>
-        <p:nvSpPr>
-          <p:cNvPr id="34" name="직사각형 33"/>
-          <p:cNvSpPr/>
-          <p:nvPr/>
-        </p:nvSpPr>
-        <p:spPr>
-          <a:xfrm>
-            <a:off x="7160431" y="2068426"/>
-            <a:ext cx="1182285" cy="539552"/>
-          </a:xfrm>
-          <a:prstGeom prst="rect">
-            <a:avLst/>
-          </a:prstGeom>
-          <a:solidFill>
-            <a:schemeClr val="bg1"/>
-          </a:solidFill>
-          <a:ln>
-            <a:solidFill>
-              <a:schemeClr val="bg1">
-                <a:lumMod val="85000"/>
-              </a:schemeClr>
-            </a:solidFill>
-            <a:prstDash val="lgDash"/>
-          </a:ln>
-        </p:spPr>
-        <p:style>
-          <a:lnRef idx="2">
-            <a:schemeClr val="accent1">
-              <a:shade val="50000"/>
-            </a:schemeClr>
-          </a:lnRef>
-          <a:fillRef idx="1">
-            <a:schemeClr val="accent1"/>
-          </a:fillRef>
-          <a:effectRef idx="0">
-            <a:schemeClr val="accent1"/>
-          </a:effectRef>
-          <a:fontRef idx="minor">
-            <a:schemeClr val="lt1"/>
-          </a:fontRef>
-        </p:style>
-        <p:txBody>
-          <a:bodyPr rtlCol="0" anchor="ctr"/>
-          <a:lstStyle/>
-          <a:p>
-            <a:pPr algn="ctr"/>
-            <a:r>
-              <a:rPr lang="en-US" altLang="ko-KR" sz="1400" b="1" dirty="0" err="1" smtClean="0">
-                <a:solidFill>
-                  <a:schemeClr val="tx1"/>
-                </a:solidFill>
-              </a:rPr>
-              <a:t>int</a:t>
-            </a:r>
-            <a:endParaRPr lang="ko-KR" altLang="en-US" sz="1400" b="1" dirty="0">
-              <a:solidFill>
-                <a:schemeClr val="tx1"/>
-              </a:solidFill>
-            </a:endParaRPr>
-          </a:p>
-        </p:txBody>
-      </p:sp>
-      <p:sp>
-        <p:nvSpPr>
-          <p:cNvPr id="35" name="직사각형 34"/>
-          <p:cNvSpPr/>
-          <p:nvPr/>
-        </p:nvSpPr>
-        <p:spPr>
-          <a:xfrm>
-            <a:off x="9436970" y="2068426"/>
-            <a:ext cx="1182285" cy="539552"/>
-          </a:xfrm>
-          <a:prstGeom prst="rect">
-            <a:avLst/>
-          </a:prstGeom>
-          <a:solidFill>
-            <a:schemeClr val="bg1"/>
-          </a:solidFill>
-          <a:ln w="28575">
-            <a:solidFill>
-              <a:schemeClr val="accent6"/>
-            </a:solidFill>
-            <a:prstDash val="solid"/>
-          </a:ln>
-        </p:spPr>
-        <p:style>
-          <a:lnRef idx="2">
-            <a:schemeClr val="accent1">
-              <a:shade val="50000"/>
-            </a:schemeClr>
-          </a:lnRef>
-          <a:fillRef idx="1">
-            <a:schemeClr val="accent1"/>
-          </a:fillRef>
-          <a:effectRef idx="0">
-            <a:schemeClr val="accent1"/>
-          </a:effectRef>
-          <a:fontRef idx="minor">
-            <a:schemeClr val="lt1"/>
-          </a:fontRef>
-        </p:style>
-        <p:txBody>
-          <a:bodyPr rtlCol="0" anchor="ctr"/>
-          <a:lstStyle/>
-          <a:p>
-            <a:pPr algn="ctr"/>
-            <a:r>
-              <a:rPr lang="en-US" altLang="ko-KR" sz="1400" b="1" dirty="0" smtClean="0">
-                <a:solidFill>
-                  <a:schemeClr val="tx1"/>
-                </a:solidFill>
-              </a:rPr>
-              <a:t>double</a:t>
-            </a:r>
-            <a:endParaRPr lang="ko-KR" altLang="en-US" sz="1400" b="1" dirty="0">
-              <a:solidFill>
-                <a:schemeClr val="tx1"/>
-              </a:solidFill>
-            </a:endParaRPr>
-          </a:p>
-        </p:txBody>
-      </p:sp>
-      <p:sp>
-        <p:nvSpPr>
-          <p:cNvPr id="36" name="위쪽 화살표 35"/>
-          <p:cNvSpPr/>
-          <p:nvPr/>
-        </p:nvSpPr>
-        <p:spPr>
-          <a:xfrm>
-            <a:off x="7501674" y="2483976"/>
-            <a:ext cx="499797" cy="903042"/>
+          <a:xfrm rot="5400000">
+            <a:off x="1504628" y="1984042"/>
+            <a:ext cx="339616" cy="353499"/>
           </a:xfrm>
           <a:prstGeom prst="upArrow">
             <a:avLst>
@@ -4222,695 +4430,484 @@
           </a:p>
         </p:txBody>
       </p:sp>
-      <p:sp>
-        <p:nvSpPr>
-          <p:cNvPr id="37" name="위쪽 화살표 36"/>
-          <p:cNvSpPr/>
+      <p:grpSp>
+        <p:nvGrpSpPr>
+          <p:cNvPr id="68" name="그룹 67"/>
+          <p:cNvGrpSpPr/>
           <p:nvPr/>
-        </p:nvSpPr>
-        <p:spPr>
-          <a:xfrm rot="10800000">
-            <a:off x="9778212" y="2483976"/>
-            <a:ext cx="499797" cy="903042"/>
+        </p:nvGrpSpPr>
+        <p:grpSpPr>
+          <a:xfrm>
+            <a:off x="1159763" y="3289929"/>
+            <a:ext cx="3897221" cy="1983462"/>
+            <a:chOff x="1353548" y="4311829"/>
+            <a:chExt cx="3897221" cy="1983462"/>
           </a:xfrm>
-          <a:prstGeom prst="upArrow">
-            <a:avLst>
-              <a:gd name="adj1" fmla="val 63636"/>
-              <a:gd name="adj2" fmla="val 59091"/>
-            </a:avLst>
-          </a:prstGeom>
-          <a:solidFill>
-            <a:schemeClr val="accent6"/>
-          </a:solidFill>
-          <a:ln w="28575">
+        </p:grpSpPr>
+        <p:sp>
+          <p:nvSpPr>
+            <p:cNvPr id="66" name="직사각형 65"/>
+            <p:cNvSpPr/>
+            <p:nvPr/>
+          </p:nvSpPr>
+          <p:spPr>
+            <a:xfrm>
+              <a:off x="3165231" y="5757923"/>
+              <a:ext cx="430823" cy="537368"/>
+            </a:xfrm>
+            <a:prstGeom prst="rect">
+              <a:avLst/>
+            </a:prstGeom>
             <a:solidFill>
-              <a:schemeClr val="bg1"/>
+              <a:schemeClr val="accent4">
+                <a:lumMod val="20000"/>
+                <a:lumOff val="80000"/>
+              </a:schemeClr>
             </a:solidFill>
-          </a:ln>
-        </p:spPr>
-        <p:style>
-          <a:lnRef idx="2">
-            <a:schemeClr val="accent6">
-              <a:shade val="50000"/>
-            </a:schemeClr>
-          </a:lnRef>
-          <a:fillRef idx="1">
-            <a:schemeClr val="accent6"/>
-          </a:fillRef>
-          <a:effectRef idx="0">
-            <a:schemeClr val="accent6"/>
-          </a:effectRef>
-          <a:fontRef idx="minor">
-            <a:schemeClr val="lt1"/>
-          </a:fontRef>
-        </p:style>
-        <p:txBody>
-          <a:bodyPr rtlCol="0" anchor="ctr"/>
-          <a:lstStyle/>
-          <a:p>
-            <a:pPr algn="ctr"/>
-            <a:endParaRPr lang="ko-KR" altLang="en-US"/>
-          </a:p>
-        </p:txBody>
-      </p:sp>
-      <p:cxnSp>
-        <p:nvCxnSpPr>
-          <p:cNvPr id="38" name="직선 화살표 연결선 37"/>
-          <p:cNvCxnSpPr>
-            <a:stCxn id="34" idx="3"/>
-            <a:endCxn id="35" idx="1"/>
-          </p:cNvCxnSpPr>
+            <a:ln>
+              <a:solidFill>
+                <a:schemeClr val="accent4">
+                  <a:lumMod val="20000"/>
+                  <a:lumOff val="80000"/>
+                </a:schemeClr>
+              </a:solidFill>
+            </a:ln>
+          </p:spPr>
+          <p:style>
+            <a:lnRef idx="2">
+              <a:schemeClr val="accent1">
+                <a:shade val="50000"/>
+              </a:schemeClr>
+            </a:lnRef>
+            <a:fillRef idx="1">
+              <a:schemeClr val="accent1"/>
+            </a:fillRef>
+            <a:effectRef idx="0">
+              <a:schemeClr val="accent1"/>
+            </a:effectRef>
+            <a:fontRef idx="minor">
+              <a:schemeClr val="lt1"/>
+            </a:fontRef>
+          </p:style>
+          <p:txBody>
+            <a:bodyPr rtlCol="0" anchor="ctr"/>
+            <a:lstStyle/>
+            <a:p>
+              <a:pPr algn="ctr"/>
+              <a:endParaRPr lang="ko-KR" altLang="en-US"/>
+            </a:p>
+          </p:txBody>
+        </p:sp>
+        <p:sp>
+          <p:nvSpPr>
+            <p:cNvPr id="63" name="TextBox 62"/>
+            <p:cNvSpPr txBox="1"/>
+            <p:nvPr/>
+          </p:nvSpPr>
+          <p:spPr>
+            <a:xfrm>
+              <a:off x="1353548" y="4311829"/>
+              <a:ext cx="3897221" cy="1877437"/>
+            </a:xfrm>
+            <a:prstGeom prst="rect">
+              <a:avLst/>
+            </a:prstGeom>
+            <a:noFill/>
+          </p:spPr>
+          <p:txBody>
+            <a:bodyPr wrap="none" rtlCol="0">
+              <a:spAutoFit/>
+            </a:bodyPr>
+            <a:lstStyle/>
+            <a:p>
+              <a:pPr>
+                <a:lnSpc>
+                  <a:spcPct val="150000"/>
+                </a:lnSpc>
+              </a:pPr>
+              <a:r>
+                <a:rPr lang="en-US" altLang="ko-KR" sz="1400" b="1" dirty="0" smtClean="0"/>
+                <a:t>double</a:t>
+              </a:r>
+              <a:r>
+                <a:rPr lang="en-US" altLang="ko-KR" sz="1400" dirty="0" smtClean="0"/>
+                <a:t> </a:t>
+              </a:r>
+              <a:r>
+                <a:rPr lang="en-US" altLang="ko-KR" sz="2000" b="1" dirty="0" smtClean="0"/>
+                <a:t>f</a:t>
+              </a:r>
+              <a:r>
+                <a:rPr lang="en-US" altLang="ko-KR" sz="1400" dirty="0" smtClean="0"/>
+                <a:t>(</a:t>
+              </a:r>
+              <a:r>
+                <a:rPr lang="en-US" altLang="ko-KR" sz="1400" b="1" dirty="0" err="1" smtClean="0"/>
+                <a:t>int</a:t>
+              </a:r>
+              <a:r>
+                <a:rPr lang="en-US" altLang="ko-KR" sz="1400" dirty="0" smtClean="0"/>
+                <a:t> value)</a:t>
+              </a:r>
+            </a:p>
+            <a:p>
+              <a:r>
+                <a:rPr lang="en-US" altLang="ko-KR" sz="1400" dirty="0" smtClean="0"/>
+                <a:t>{</a:t>
+              </a:r>
+            </a:p>
+            <a:p>
+              <a:r>
+                <a:rPr lang="en-US" altLang="ko-KR" sz="1400" dirty="0" smtClean="0"/>
+                <a:t>      …</a:t>
+              </a:r>
+            </a:p>
+            <a:p>
+              <a:r>
+                <a:rPr lang="en-US" altLang="ko-KR" sz="1400" dirty="0" smtClean="0"/>
+                <a:t>}</a:t>
+              </a:r>
+            </a:p>
+            <a:p>
+              <a:endParaRPr lang="en-US" altLang="ko-KR" sz="1400" smtClean="0"/>
+            </a:p>
+            <a:p>
+              <a:r>
+                <a:rPr lang="en-US" altLang="ko-KR" sz="1400" b="1" smtClean="0">
+                  <a:solidFill>
+                    <a:srgbClr val="0070C0"/>
+                  </a:solidFill>
+                </a:rPr>
+                <a:t>A&lt;</a:t>
+              </a:r>
+              <a:r>
+                <a:rPr lang="en-US" altLang="ko-KR" sz="1400" smtClean="0"/>
+                <a:t>int</a:t>
+              </a:r>
+              <a:r>
+                <a:rPr lang="en-US" altLang="ko-KR" sz="1400" b="1" smtClean="0">
+                  <a:solidFill>
+                    <a:srgbClr val="0070C0"/>
+                  </a:solidFill>
+                </a:rPr>
+                <a:t>&gt;</a:t>
+              </a:r>
+              <a:r>
+                <a:rPr lang="en-US" altLang="ko-KR" sz="1400" smtClean="0"/>
+                <a:t> xyz = …;</a:t>
+              </a:r>
+              <a:endParaRPr lang="en-US" altLang="ko-KR" sz="1400" dirty="0"/>
+            </a:p>
+            <a:p>
+              <a:r>
+                <a:rPr lang="en-US" altLang="ko-KR" sz="1400" b="1" smtClean="0">
+                  <a:solidFill>
+                    <a:srgbClr val="0070C0"/>
+                  </a:solidFill>
+                </a:rPr>
+                <a:t>A&lt;</a:t>
+              </a:r>
+              <a:r>
+                <a:rPr lang="en-US" altLang="ko-KR" sz="1400" smtClean="0"/>
+                <a:t>double</a:t>
+              </a:r>
+              <a:r>
+                <a:rPr lang="en-US" altLang="ko-KR" sz="1400" b="1" smtClean="0">
+                  <a:solidFill>
+                    <a:srgbClr val="0070C0"/>
+                  </a:solidFill>
+                </a:rPr>
+                <a:t>&gt;</a:t>
+              </a:r>
+              <a:r>
+                <a:rPr lang="en-US" altLang="ko-KR" sz="1400" smtClean="0"/>
+                <a:t> ret = xyz.</a:t>
+              </a:r>
+              <a:r>
+                <a:rPr lang="en-US" altLang="ko-KR" sz="1400" b="1" smtClean="0">
+                  <a:solidFill>
+                    <a:srgbClr val="C00000"/>
+                  </a:solidFill>
+                </a:rPr>
+                <a:t>Map</a:t>
+              </a:r>
+              <a:r>
+                <a:rPr lang="en-US" altLang="ko-KR" sz="1400" smtClean="0"/>
+                <a:t>(value </a:t>
+              </a:r>
+              <a:r>
+                <a:rPr lang="en-US" altLang="ko-KR" sz="1400" dirty="0" smtClean="0"/>
+                <a:t>=&gt;</a:t>
+              </a:r>
+              <a:r>
+                <a:rPr lang="en-US" altLang="ko-KR" sz="1600" dirty="0" smtClean="0"/>
+                <a:t> </a:t>
+              </a:r>
+              <a:r>
+                <a:rPr lang="en-US" altLang="ko-KR" sz="1600" b="1" dirty="0" smtClean="0"/>
+                <a:t>f</a:t>
+              </a:r>
+              <a:r>
+                <a:rPr lang="en-US" altLang="ko-KR" sz="1400" dirty="0" smtClean="0"/>
+                <a:t>(value));</a:t>
+              </a:r>
+              <a:endParaRPr lang="ko-KR" altLang="en-US" sz="1600" dirty="0"/>
+            </a:p>
+          </p:txBody>
+        </p:sp>
+      </p:grpSp>
+      <p:grpSp>
+        <p:nvGrpSpPr>
+          <p:cNvPr id="69" name="그룹 68"/>
+          <p:cNvGrpSpPr/>
           <p:nvPr/>
-        </p:nvCxnSpPr>
-        <p:spPr>
+        </p:nvGrpSpPr>
+        <p:grpSpPr>
           <a:xfrm>
-            <a:off x="8342716" y="2338202"/>
-            <a:ext cx="1094254" cy="0"/>
+            <a:off x="7452306" y="3289929"/>
+            <a:ext cx="3884397" cy="1983462"/>
+            <a:chOff x="6947645" y="4311829"/>
+            <a:chExt cx="3884397" cy="1983462"/>
           </a:xfrm>
-          <a:prstGeom prst="straightConnector1">
-            <a:avLst/>
-          </a:prstGeom>
-          <a:ln w="38100">
-            <a:tailEnd type="triangle"/>
-          </a:ln>
-        </p:spPr>
-        <p:style>
-          <a:lnRef idx="3">
-            <a:schemeClr val="dk1"/>
-          </a:lnRef>
-          <a:fillRef idx="0">
-            <a:schemeClr val="dk1"/>
-          </a:fillRef>
-          <a:effectRef idx="2">
-            <a:schemeClr val="dk1"/>
-          </a:effectRef>
-          <a:fontRef idx="minor">
-            <a:schemeClr val="tx1"/>
-          </a:fontRef>
-        </p:style>
-      </p:cxnSp>
-      <p:sp>
-        <p:nvSpPr>
-          <p:cNvPr id="39" name="TextBox 38"/>
-          <p:cNvSpPr txBox="1"/>
-          <p:nvPr/>
-        </p:nvSpPr>
-        <p:spPr>
-          <a:xfrm>
-            <a:off x="8739802" y="1837593"/>
-            <a:ext cx="300082" cy="461665"/>
-          </a:xfrm>
-          <a:prstGeom prst="rect">
-            <a:avLst/>
-          </a:prstGeom>
-          <a:noFill/>
-        </p:spPr>
-        <p:txBody>
-          <a:bodyPr wrap="none" rtlCol="0">
-            <a:spAutoFit/>
-          </a:bodyPr>
-          <a:lstStyle/>
-          <a:p>
-            <a:r>
-              <a:rPr lang="en-US" altLang="ko-KR" sz="2400" b="1" dirty="0" smtClean="0"/>
-              <a:t>f</a:t>
-            </a:r>
-            <a:endParaRPr lang="ko-KR" altLang="en-US" sz="2400" b="1" dirty="0"/>
-          </a:p>
-        </p:txBody>
-      </p:sp>
-      <p:sp>
-        <p:nvSpPr>
-          <p:cNvPr id="40" name="타원 39"/>
-          <p:cNvSpPr/>
-          <p:nvPr/>
-        </p:nvSpPr>
-        <p:spPr>
-          <a:xfrm>
-            <a:off x="7578347" y="3706962"/>
-            <a:ext cx="346449" cy="352129"/>
-          </a:xfrm>
-          <a:prstGeom prst="ellipse">
-            <a:avLst/>
-          </a:prstGeom>
-        </p:spPr>
-        <p:style>
-          <a:lnRef idx="1">
-            <a:schemeClr val="accent5"/>
-          </a:lnRef>
-          <a:fillRef idx="3">
-            <a:schemeClr val="accent5"/>
-          </a:fillRef>
-          <a:effectRef idx="2">
-            <a:schemeClr val="accent5"/>
-          </a:effectRef>
-          <a:fontRef idx="minor">
-            <a:schemeClr val="lt1"/>
-          </a:fontRef>
-        </p:style>
-        <p:txBody>
-          <a:bodyPr rtlCol="0" anchor="ctr"/>
-          <a:lstStyle/>
-          <a:p>
-            <a:pPr algn="ctr"/>
-            <a:r>
-              <a:rPr lang="en-US" altLang="ko-KR" sz="1200" b="1" dirty="0" smtClean="0"/>
-              <a:t>A</a:t>
-            </a:r>
-            <a:endParaRPr lang="ko-KR" altLang="en-US" sz="1200" b="1" dirty="0"/>
-          </a:p>
-        </p:txBody>
-      </p:sp>
-      <p:sp>
-        <p:nvSpPr>
-          <p:cNvPr id="41" name="타원 40"/>
-          <p:cNvSpPr/>
-          <p:nvPr/>
-        </p:nvSpPr>
-        <p:spPr>
-          <a:xfrm>
-            <a:off x="9854884" y="3706962"/>
-            <a:ext cx="346449" cy="352129"/>
-          </a:xfrm>
-          <a:prstGeom prst="ellipse">
-            <a:avLst/>
-          </a:prstGeom>
-        </p:spPr>
-        <p:style>
-          <a:lnRef idx="1">
-            <a:schemeClr val="accent6"/>
-          </a:lnRef>
-          <a:fillRef idx="3">
-            <a:schemeClr val="accent6"/>
-          </a:fillRef>
-          <a:effectRef idx="2">
-            <a:schemeClr val="accent6"/>
-          </a:effectRef>
-          <a:fontRef idx="minor">
-            <a:schemeClr val="lt1"/>
-          </a:fontRef>
-        </p:style>
-        <p:txBody>
-          <a:bodyPr rtlCol="0" anchor="ctr"/>
-          <a:lstStyle/>
-          <a:p>
-            <a:pPr algn="ctr"/>
-            <a:r>
-              <a:rPr lang="en-US" altLang="ko-KR" sz="1200" b="1" dirty="0" smtClean="0"/>
-              <a:t>B</a:t>
-            </a:r>
-            <a:endParaRPr lang="ko-KR" altLang="en-US" sz="1200" b="1" dirty="0"/>
-          </a:p>
-        </p:txBody>
-      </p:sp>
-      <p:sp>
-        <p:nvSpPr>
-          <p:cNvPr id="42" name="타원 41"/>
-          <p:cNvSpPr/>
-          <p:nvPr/>
-        </p:nvSpPr>
-        <p:spPr>
-          <a:xfrm>
-            <a:off x="9854885" y="1811902"/>
-            <a:ext cx="346449" cy="352129"/>
-          </a:xfrm>
-          <a:prstGeom prst="ellipse">
-            <a:avLst/>
-          </a:prstGeom>
-        </p:spPr>
-        <p:style>
-          <a:lnRef idx="1">
-            <a:schemeClr val="accent6"/>
-          </a:lnRef>
-          <a:fillRef idx="3">
-            <a:schemeClr val="accent6"/>
-          </a:fillRef>
-          <a:effectRef idx="2">
-            <a:schemeClr val="accent6"/>
-          </a:effectRef>
-          <a:fontRef idx="minor">
-            <a:schemeClr val="lt1"/>
-          </a:fontRef>
-        </p:style>
-        <p:txBody>
-          <a:bodyPr rtlCol="0" anchor="ctr"/>
-          <a:lstStyle/>
-          <a:p>
-            <a:pPr algn="ctr"/>
-            <a:r>
-              <a:rPr lang="en-US" altLang="ko-KR" sz="1200" b="1" dirty="0" smtClean="0"/>
-              <a:t>B</a:t>
-            </a:r>
-            <a:endParaRPr lang="ko-KR" altLang="en-US" sz="1200" b="1" dirty="0"/>
-          </a:p>
-        </p:txBody>
-      </p:sp>
-      <p:sp>
-        <p:nvSpPr>
-          <p:cNvPr id="43" name="TextBox 42"/>
-          <p:cNvSpPr txBox="1"/>
-          <p:nvPr/>
-        </p:nvSpPr>
-        <p:spPr>
-          <a:xfrm>
-            <a:off x="2882010" y="884178"/>
-            <a:ext cx="840295" cy="461665"/>
-          </a:xfrm>
-          <a:prstGeom prst="rect">
-            <a:avLst/>
-          </a:prstGeom>
-          <a:noFill/>
-        </p:spPr>
-        <p:txBody>
-          <a:bodyPr wrap="none" rtlCol="0">
-            <a:spAutoFit/>
-          </a:bodyPr>
-          <a:lstStyle/>
-          <a:p>
-            <a:r>
-              <a:rPr lang="en-US" altLang="ko-KR" sz="2400" b="1" dirty="0" smtClean="0"/>
-              <a:t>Map</a:t>
-            </a:r>
-            <a:endParaRPr lang="ko-KR" altLang="en-US" sz="2400" b="1" dirty="0"/>
-          </a:p>
-        </p:txBody>
-      </p:sp>
-      <p:sp>
-        <p:nvSpPr>
-          <p:cNvPr id="44" name="TextBox 43"/>
-          <p:cNvSpPr txBox="1"/>
-          <p:nvPr/>
-        </p:nvSpPr>
-        <p:spPr>
-          <a:xfrm>
-            <a:off x="8467292" y="884178"/>
-            <a:ext cx="845103" cy="461665"/>
-          </a:xfrm>
-          <a:prstGeom prst="rect">
-            <a:avLst/>
-          </a:prstGeom>
-          <a:noFill/>
-        </p:spPr>
-        <p:txBody>
-          <a:bodyPr wrap="none" rtlCol="0">
-            <a:spAutoFit/>
-          </a:bodyPr>
-          <a:lstStyle/>
-          <a:p>
-            <a:r>
-              <a:rPr lang="en-US" altLang="ko-KR" sz="2400" b="1" dirty="0" smtClean="0"/>
-              <a:t>Bind</a:t>
-            </a:r>
-            <a:endParaRPr lang="ko-KR" altLang="en-US" sz="2400" b="1" dirty="0"/>
-          </a:p>
-        </p:txBody>
-      </p:sp>
-      <p:sp>
-        <p:nvSpPr>
-          <p:cNvPr id="45" name="TextBox 44"/>
-          <p:cNvSpPr txBox="1"/>
-          <p:nvPr/>
-        </p:nvSpPr>
-        <p:spPr>
-          <a:xfrm>
-            <a:off x="1353548" y="4311829"/>
-            <a:ext cx="3897221" cy="1877437"/>
-          </a:xfrm>
-          <a:prstGeom prst="rect">
-            <a:avLst/>
-          </a:prstGeom>
-          <a:noFill/>
-        </p:spPr>
-        <p:txBody>
-          <a:bodyPr wrap="none" rtlCol="0">
-            <a:spAutoFit/>
-          </a:bodyPr>
-          <a:lstStyle/>
-          <a:p>
-            <a:pPr>
-              <a:lnSpc>
-                <a:spcPct val="150000"/>
-              </a:lnSpc>
-            </a:pPr>
-            <a:r>
-              <a:rPr lang="en-US" altLang="ko-KR" sz="1400" b="1" dirty="0" smtClean="0"/>
-              <a:t>double</a:t>
-            </a:r>
-            <a:r>
-              <a:rPr lang="en-US" altLang="ko-KR" sz="1400" dirty="0" smtClean="0"/>
-              <a:t> </a:t>
-            </a:r>
-            <a:r>
-              <a:rPr lang="en-US" altLang="ko-KR" sz="2000" b="1" dirty="0" smtClean="0"/>
-              <a:t>f</a:t>
-            </a:r>
-            <a:r>
-              <a:rPr lang="en-US" altLang="ko-KR" sz="1400" dirty="0" smtClean="0"/>
-              <a:t>(</a:t>
-            </a:r>
-            <a:r>
-              <a:rPr lang="en-US" altLang="ko-KR" sz="1400" b="1" dirty="0" err="1" smtClean="0"/>
-              <a:t>int</a:t>
-            </a:r>
-            <a:r>
-              <a:rPr lang="en-US" altLang="ko-KR" sz="1400" dirty="0" smtClean="0"/>
-              <a:t> value)</a:t>
-            </a:r>
-          </a:p>
-          <a:p>
-            <a:r>
-              <a:rPr lang="en-US" altLang="ko-KR" sz="1400" dirty="0" smtClean="0"/>
-              <a:t>{</a:t>
-            </a:r>
-          </a:p>
-          <a:p>
-            <a:r>
-              <a:rPr lang="en-US" altLang="ko-KR" sz="1400" dirty="0" smtClean="0"/>
-              <a:t>      …</a:t>
-            </a:r>
-          </a:p>
-          <a:p>
-            <a:r>
-              <a:rPr lang="en-US" altLang="ko-KR" sz="1400" dirty="0" smtClean="0"/>
-              <a:t>}</a:t>
-            </a:r>
-          </a:p>
-          <a:p>
-            <a:endParaRPr lang="en-US" altLang="ko-KR" sz="1400" smtClean="0"/>
-          </a:p>
-          <a:p>
-            <a:r>
-              <a:rPr lang="en-US" altLang="ko-KR" sz="1400" b="1" smtClean="0">
-                <a:solidFill>
-                  <a:srgbClr val="0070C0"/>
-                </a:solidFill>
-              </a:rPr>
-              <a:t>A&lt;</a:t>
-            </a:r>
-            <a:r>
-              <a:rPr lang="en-US" altLang="ko-KR" sz="1400" smtClean="0"/>
-              <a:t>int</a:t>
-            </a:r>
-            <a:r>
-              <a:rPr lang="en-US" altLang="ko-KR" sz="1400" b="1" smtClean="0">
-                <a:solidFill>
-                  <a:srgbClr val="0070C0"/>
-                </a:solidFill>
-              </a:rPr>
-              <a:t>&gt;</a:t>
-            </a:r>
-            <a:r>
-              <a:rPr lang="en-US" altLang="ko-KR" sz="1400" smtClean="0"/>
-              <a:t> xyz = …;</a:t>
-            </a:r>
-            <a:endParaRPr lang="en-US" altLang="ko-KR" sz="1400" dirty="0"/>
-          </a:p>
-          <a:p>
-            <a:r>
-              <a:rPr lang="en-US" altLang="ko-KR" sz="1400" b="1" smtClean="0">
-                <a:solidFill>
-                  <a:srgbClr val="0070C0"/>
-                </a:solidFill>
-              </a:rPr>
-              <a:t>A&lt;</a:t>
-            </a:r>
-            <a:r>
-              <a:rPr lang="en-US" altLang="ko-KR" sz="1400" smtClean="0"/>
-              <a:t>double</a:t>
-            </a:r>
-            <a:r>
-              <a:rPr lang="en-US" altLang="ko-KR" sz="1400" b="1" smtClean="0">
-                <a:solidFill>
-                  <a:srgbClr val="0070C0"/>
-                </a:solidFill>
-              </a:rPr>
-              <a:t>&gt;</a:t>
-            </a:r>
-            <a:r>
-              <a:rPr lang="en-US" altLang="ko-KR" sz="1400" smtClean="0"/>
-              <a:t> ret = xyz.</a:t>
-            </a:r>
-            <a:r>
-              <a:rPr lang="en-US" altLang="ko-KR" sz="1400" b="1" smtClean="0"/>
-              <a:t>Map</a:t>
-            </a:r>
-            <a:r>
-              <a:rPr lang="en-US" altLang="ko-KR" sz="1400" smtClean="0"/>
-              <a:t>(value </a:t>
-            </a:r>
-            <a:r>
-              <a:rPr lang="en-US" altLang="ko-KR" sz="1400" dirty="0" smtClean="0"/>
-              <a:t>=&gt;</a:t>
-            </a:r>
-            <a:r>
-              <a:rPr lang="en-US" altLang="ko-KR" sz="1600" dirty="0" smtClean="0"/>
-              <a:t> </a:t>
-            </a:r>
-            <a:r>
-              <a:rPr lang="en-US" altLang="ko-KR" sz="1600" b="1" dirty="0" smtClean="0"/>
-              <a:t>f</a:t>
-            </a:r>
-            <a:r>
-              <a:rPr lang="en-US" altLang="ko-KR" sz="1400" dirty="0" smtClean="0"/>
-              <a:t>(value));</a:t>
-            </a:r>
-            <a:endParaRPr lang="ko-KR" altLang="en-US" sz="1600" dirty="0"/>
-          </a:p>
-        </p:txBody>
-      </p:sp>
-      <p:sp>
-        <p:nvSpPr>
-          <p:cNvPr id="46" name="TextBox 45"/>
-          <p:cNvSpPr txBox="1"/>
-          <p:nvPr/>
-        </p:nvSpPr>
-        <p:spPr>
-          <a:xfrm>
-            <a:off x="6947645" y="4311829"/>
-            <a:ext cx="3884397" cy="1877437"/>
-          </a:xfrm>
-          <a:prstGeom prst="rect">
-            <a:avLst/>
-          </a:prstGeom>
-          <a:noFill/>
-        </p:spPr>
-        <p:txBody>
-          <a:bodyPr wrap="none" rtlCol="0">
-            <a:spAutoFit/>
-          </a:bodyPr>
-          <a:lstStyle/>
-          <a:p>
-            <a:pPr>
-              <a:lnSpc>
-                <a:spcPct val="150000"/>
-              </a:lnSpc>
-            </a:pPr>
-            <a:r>
-              <a:rPr lang="en-US" altLang="ko-KR" sz="1400" b="1" smtClean="0">
-                <a:solidFill>
-                  <a:schemeClr val="accent6"/>
-                </a:solidFill>
-              </a:rPr>
-              <a:t>B&lt;</a:t>
-            </a:r>
-            <a:r>
-              <a:rPr lang="en-US" altLang="ko-KR" sz="1400" b="1" smtClean="0"/>
-              <a:t>double</a:t>
-            </a:r>
-            <a:r>
-              <a:rPr lang="en-US" altLang="ko-KR" sz="1400" b="1" dirty="0" smtClean="0">
-                <a:solidFill>
-                  <a:schemeClr val="accent6"/>
-                </a:solidFill>
-              </a:rPr>
-              <a:t>&gt;</a:t>
-            </a:r>
-            <a:r>
-              <a:rPr lang="en-US" altLang="ko-KR" sz="1400" dirty="0" smtClean="0"/>
-              <a:t> </a:t>
-            </a:r>
-            <a:r>
-              <a:rPr lang="en-US" altLang="ko-KR" sz="2000" b="1" dirty="0" smtClean="0"/>
-              <a:t>f</a:t>
-            </a:r>
-            <a:r>
-              <a:rPr lang="en-US" altLang="ko-KR" sz="1400" dirty="0" smtClean="0"/>
-              <a:t>(</a:t>
-            </a:r>
-            <a:r>
-              <a:rPr lang="en-US" altLang="ko-KR" sz="1400" b="1" dirty="0" err="1" smtClean="0"/>
-              <a:t>int</a:t>
-            </a:r>
-            <a:r>
-              <a:rPr lang="en-US" altLang="ko-KR" sz="1400" dirty="0" smtClean="0"/>
-              <a:t> value)</a:t>
-            </a:r>
-          </a:p>
-          <a:p>
-            <a:r>
-              <a:rPr lang="en-US" altLang="ko-KR" sz="1400" dirty="0" smtClean="0"/>
-              <a:t>{</a:t>
-            </a:r>
-          </a:p>
-          <a:p>
-            <a:r>
-              <a:rPr lang="en-US" altLang="ko-KR" sz="1400" dirty="0" smtClean="0"/>
-              <a:t>      …</a:t>
-            </a:r>
-          </a:p>
-          <a:p>
-            <a:r>
-              <a:rPr lang="en-US" altLang="ko-KR" sz="1400" dirty="0" smtClean="0"/>
-              <a:t>}</a:t>
-            </a:r>
-          </a:p>
-          <a:p>
-            <a:endParaRPr lang="en-US" altLang="ko-KR" sz="1400" smtClean="0"/>
-          </a:p>
-          <a:p>
-            <a:r>
-              <a:rPr lang="en-US" altLang="ko-KR" sz="1400" b="1" smtClean="0">
-                <a:solidFill>
-                  <a:srgbClr val="0070C0"/>
-                </a:solidFill>
-              </a:rPr>
-              <a:t>A&lt;</a:t>
-            </a:r>
-            <a:r>
-              <a:rPr lang="en-US" altLang="ko-KR" sz="1400" smtClean="0"/>
-              <a:t>int</a:t>
-            </a:r>
-            <a:r>
-              <a:rPr lang="en-US" altLang="ko-KR" sz="1400" b="1" smtClean="0">
-                <a:solidFill>
-                  <a:srgbClr val="0070C0"/>
-                </a:solidFill>
-              </a:rPr>
-              <a:t>&gt;</a:t>
-            </a:r>
-            <a:r>
-              <a:rPr lang="en-US" altLang="ko-KR" sz="1400" smtClean="0"/>
-              <a:t> xzy = …;</a:t>
-            </a:r>
-            <a:endParaRPr lang="en-US" altLang="ko-KR" sz="1400" dirty="0"/>
-          </a:p>
-          <a:p>
-            <a:r>
-              <a:rPr lang="en-US" altLang="ko-KR" sz="1400" b="1" smtClean="0">
-                <a:solidFill>
-                  <a:schemeClr val="accent6"/>
-                </a:solidFill>
-              </a:rPr>
-              <a:t>B&lt;</a:t>
-            </a:r>
-            <a:r>
-              <a:rPr lang="en-US" altLang="ko-KR" sz="1400" smtClean="0"/>
-              <a:t>double</a:t>
-            </a:r>
-            <a:r>
-              <a:rPr lang="en-US" altLang="ko-KR" sz="1400" b="1" smtClean="0">
-                <a:solidFill>
-                  <a:schemeClr val="accent6"/>
-                </a:solidFill>
-              </a:rPr>
-              <a:t>&gt;</a:t>
-            </a:r>
-            <a:r>
-              <a:rPr lang="en-US" altLang="ko-KR" sz="1400" smtClean="0"/>
-              <a:t> ret = xyz.</a:t>
-            </a:r>
-            <a:r>
-              <a:rPr lang="en-US" altLang="ko-KR" sz="1400" b="1" smtClean="0"/>
-              <a:t>Bind</a:t>
-            </a:r>
-            <a:r>
-              <a:rPr lang="en-US" altLang="ko-KR" sz="1400" smtClean="0"/>
-              <a:t>(value </a:t>
-            </a:r>
-            <a:r>
-              <a:rPr lang="en-US" altLang="ko-KR" sz="1400" dirty="0" smtClean="0"/>
-              <a:t>=&gt;</a:t>
-            </a:r>
-            <a:r>
-              <a:rPr lang="en-US" altLang="ko-KR" sz="1600" dirty="0" smtClean="0"/>
-              <a:t> </a:t>
-            </a:r>
-            <a:r>
-              <a:rPr lang="en-US" altLang="ko-KR" sz="1600" b="1" dirty="0" smtClean="0"/>
-              <a:t>f</a:t>
-            </a:r>
-            <a:r>
-              <a:rPr lang="en-US" altLang="ko-KR" sz="1400" dirty="0" smtClean="0"/>
-              <a:t>(value));</a:t>
-            </a:r>
-            <a:endParaRPr lang="ko-KR" altLang="en-US" sz="1600" dirty="0"/>
-          </a:p>
-        </p:txBody>
-      </p:sp>
-      <p:sp>
-        <p:nvSpPr>
-          <p:cNvPr id="49" name="TextBox 48"/>
-          <p:cNvSpPr txBox="1"/>
-          <p:nvPr/>
-        </p:nvSpPr>
-        <p:spPr>
-          <a:xfrm>
-            <a:off x="9177554" y="4845704"/>
-            <a:ext cx="1701107" cy="261610"/>
-          </a:xfrm>
-          <a:prstGeom prst="rect">
-            <a:avLst/>
-          </a:prstGeom>
-          <a:noFill/>
-        </p:spPr>
-        <p:txBody>
-          <a:bodyPr wrap="none" rtlCol="0">
-            <a:spAutoFit/>
-          </a:bodyPr>
-          <a:lstStyle/>
-          <a:p>
-            <a:r>
-              <a:rPr lang="en-US" altLang="ko-KR" sz="1100" dirty="0" smtClean="0">
-                <a:latin typeface="Yu Gothic UI Semilight" panose="020B0400000000000000" pitchFamily="34" charset="-128"/>
-                <a:ea typeface="Yu Gothic UI Semilight" panose="020B0400000000000000" pitchFamily="34" charset="-128"/>
-              </a:rPr>
-              <a:t>※ Option</a:t>
-            </a:r>
-            <a:r>
-              <a:rPr lang="ko-KR" altLang="en-US" sz="1100" dirty="0" smtClean="0">
-                <a:latin typeface="Yu Gothic UI Semilight" panose="020B0400000000000000" pitchFamily="34" charset="-128"/>
-                <a:ea typeface="Yu Gothic UI Semilight" panose="020B0400000000000000" pitchFamily="34" charset="-128"/>
-              </a:rPr>
-              <a:t>은 컨테이너다</a:t>
-            </a:r>
-            <a:r>
-              <a:rPr lang="en-US" altLang="ko-KR" sz="1100" dirty="0" smtClean="0">
-                <a:latin typeface="Yu Gothic UI Semilight" panose="020B0400000000000000" pitchFamily="34" charset="-128"/>
-                <a:ea typeface="Yu Gothic UI Semilight" panose="020B0400000000000000" pitchFamily="34" charset="-128"/>
-              </a:rPr>
-              <a:t>.</a:t>
-            </a:r>
-            <a:endParaRPr lang="ko-KR" altLang="en-US" sz="1100" dirty="0"/>
-          </a:p>
-        </p:txBody>
-      </p:sp>
+        </p:grpSpPr>
+        <p:sp>
+          <p:nvSpPr>
+            <p:cNvPr id="67" name="직사각형 66"/>
+            <p:cNvSpPr/>
+            <p:nvPr/>
+          </p:nvSpPr>
+          <p:spPr>
+            <a:xfrm>
+              <a:off x="8773251" y="5757923"/>
+              <a:ext cx="430823" cy="537368"/>
+            </a:xfrm>
+            <a:prstGeom prst="rect">
+              <a:avLst/>
+            </a:prstGeom>
+            <a:solidFill>
+              <a:schemeClr val="accent4">
+                <a:lumMod val="20000"/>
+                <a:lumOff val="80000"/>
+              </a:schemeClr>
+            </a:solidFill>
+            <a:ln>
+              <a:solidFill>
+                <a:schemeClr val="accent4">
+                  <a:lumMod val="20000"/>
+                  <a:lumOff val="80000"/>
+                </a:schemeClr>
+              </a:solidFill>
+            </a:ln>
+          </p:spPr>
+          <p:style>
+            <a:lnRef idx="2">
+              <a:schemeClr val="accent1">
+                <a:shade val="50000"/>
+              </a:schemeClr>
+            </a:lnRef>
+            <a:fillRef idx="1">
+              <a:schemeClr val="accent1"/>
+            </a:fillRef>
+            <a:effectRef idx="0">
+              <a:schemeClr val="accent1"/>
+            </a:effectRef>
+            <a:fontRef idx="minor">
+              <a:schemeClr val="lt1"/>
+            </a:fontRef>
+          </p:style>
+          <p:txBody>
+            <a:bodyPr rtlCol="0" anchor="ctr"/>
+            <a:lstStyle/>
+            <a:p>
+              <a:pPr algn="ctr"/>
+              <a:endParaRPr lang="ko-KR" altLang="en-US"/>
+            </a:p>
+          </p:txBody>
+        </p:sp>
+        <p:sp>
+          <p:nvSpPr>
+            <p:cNvPr id="64" name="TextBox 63"/>
+            <p:cNvSpPr txBox="1"/>
+            <p:nvPr/>
+          </p:nvSpPr>
+          <p:spPr>
+            <a:xfrm>
+              <a:off x="6947645" y="4311829"/>
+              <a:ext cx="3884397" cy="1877437"/>
+            </a:xfrm>
+            <a:prstGeom prst="rect">
+              <a:avLst/>
+            </a:prstGeom>
+            <a:noFill/>
+          </p:spPr>
+          <p:txBody>
+            <a:bodyPr wrap="none" rtlCol="0">
+              <a:spAutoFit/>
+            </a:bodyPr>
+            <a:lstStyle/>
+            <a:p>
+              <a:pPr>
+                <a:lnSpc>
+                  <a:spcPct val="150000"/>
+                </a:lnSpc>
+              </a:pPr>
+              <a:r>
+                <a:rPr lang="en-US" altLang="ko-KR" sz="1400" b="1" smtClean="0">
+                  <a:solidFill>
+                    <a:srgbClr val="0070C0"/>
+                  </a:solidFill>
+                </a:rPr>
+                <a:t>A&lt;</a:t>
+              </a:r>
+              <a:r>
+                <a:rPr lang="en-US" altLang="ko-KR" sz="1400" b="1" smtClean="0"/>
+                <a:t>double</a:t>
+              </a:r>
+              <a:r>
+                <a:rPr lang="en-US" altLang="ko-KR" sz="1400" b="1" dirty="0" smtClean="0">
+                  <a:solidFill>
+                    <a:srgbClr val="0070C0"/>
+                  </a:solidFill>
+                </a:rPr>
+                <a:t>&gt;</a:t>
+              </a:r>
+              <a:r>
+                <a:rPr lang="en-US" altLang="ko-KR" sz="1400" dirty="0" smtClean="0"/>
+                <a:t> </a:t>
+              </a:r>
+              <a:r>
+                <a:rPr lang="en-US" altLang="ko-KR" sz="2000" b="1" dirty="0" smtClean="0"/>
+                <a:t>f</a:t>
+              </a:r>
+              <a:r>
+                <a:rPr lang="en-US" altLang="ko-KR" sz="1400" dirty="0" smtClean="0"/>
+                <a:t>(</a:t>
+              </a:r>
+              <a:r>
+                <a:rPr lang="en-US" altLang="ko-KR" sz="1400" b="1" dirty="0" err="1" smtClean="0"/>
+                <a:t>int</a:t>
+              </a:r>
+              <a:r>
+                <a:rPr lang="en-US" altLang="ko-KR" sz="1400" dirty="0" smtClean="0"/>
+                <a:t> value)</a:t>
+              </a:r>
+            </a:p>
+            <a:p>
+              <a:r>
+                <a:rPr lang="en-US" altLang="ko-KR" sz="1400" dirty="0" smtClean="0"/>
+                <a:t>{</a:t>
+              </a:r>
+            </a:p>
+            <a:p>
+              <a:r>
+                <a:rPr lang="en-US" altLang="ko-KR" sz="1400" dirty="0" smtClean="0"/>
+                <a:t>      …</a:t>
+              </a:r>
+            </a:p>
+            <a:p>
+              <a:r>
+                <a:rPr lang="en-US" altLang="ko-KR" sz="1400" dirty="0" smtClean="0"/>
+                <a:t>}</a:t>
+              </a:r>
+            </a:p>
+            <a:p>
+              <a:endParaRPr lang="en-US" altLang="ko-KR" sz="1400" smtClean="0"/>
+            </a:p>
+            <a:p>
+              <a:r>
+                <a:rPr lang="en-US" altLang="ko-KR" sz="1400" b="1" smtClean="0">
+                  <a:solidFill>
+                    <a:srgbClr val="0070C0"/>
+                  </a:solidFill>
+                </a:rPr>
+                <a:t>A&lt;</a:t>
+              </a:r>
+              <a:r>
+                <a:rPr lang="en-US" altLang="ko-KR" sz="1400" smtClean="0"/>
+                <a:t>int</a:t>
+              </a:r>
+              <a:r>
+                <a:rPr lang="en-US" altLang="ko-KR" sz="1400" b="1" smtClean="0">
+                  <a:solidFill>
+                    <a:srgbClr val="0070C0"/>
+                  </a:solidFill>
+                </a:rPr>
+                <a:t>&gt;</a:t>
+              </a:r>
+              <a:r>
+                <a:rPr lang="en-US" altLang="ko-KR" sz="1400" smtClean="0"/>
+                <a:t> xzy = …;</a:t>
+              </a:r>
+              <a:endParaRPr lang="en-US" altLang="ko-KR" sz="1400" dirty="0"/>
+            </a:p>
+            <a:p>
+              <a:r>
+                <a:rPr lang="en-US" altLang="ko-KR" sz="1400" b="1" smtClean="0">
+                  <a:solidFill>
+                    <a:srgbClr val="0070C0"/>
+                  </a:solidFill>
+                </a:rPr>
+                <a:t>A&lt;</a:t>
+              </a:r>
+              <a:r>
+                <a:rPr lang="en-US" altLang="ko-KR" sz="1400" smtClean="0"/>
+                <a:t>double</a:t>
+              </a:r>
+              <a:r>
+                <a:rPr lang="en-US" altLang="ko-KR" sz="1400" b="1" smtClean="0">
+                  <a:solidFill>
+                    <a:srgbClr val="0070C0"/>
+                  </a:solidFill>
+                </a:rPr>
+                <a:t>&gt;</a:t>
+              </a:r>
+              <a:r>
+                <a:rPr lang="en-US" altLang="ko-KR" sz="1400" smtClean="0"/>
+                <a:t> ret = xyz.</a:t>
+              </a:r>
+              <a:r>
+                <a:rPr lang="en-US" altLang="ko-KR" sz="1400" b="1" smtClean="0">
+                  <a:solidFill>
+                    <a:srgbClr val="C00000"/>
+                  </a:solidFill>
+                </a:rPr>
+                <a:t>Bind</a:t>
+              </a:r>
+              <a:r>
+                <a:rPr lang="en-US" altLang="ko-KR" sz="1400" smtClean="0"/>
+                <a:t>(value </a:t>
+              </a:r>
+              <a:r>
+                <a:rPr lang="en-US" altLang="ko-KR" sz="1400" dirty="0" smtClean="0"/>
+                <a:t>=&gt;</a:t>
+              </a:r>
+              <a:r>
+                <a:rPr lang="en-US" altLang="ko-KR" sz="1600" dirty="0" smtClean="0"/>
+                <a:t> </a:t>
+              </a:r>
+              <a:r>
+                <a:rPr lang="en-US" altLang="ko-KR" sz="1600" b="1" dirty="0" smtClean="0"/>
+                <a:t>f</a:t>
+              </a:r>
+              <a:r>
+                <a:rPr lang="en-US" altLang="ko-KR" sz="1400" dirty="0" smtClean="0"/>
+                <a:t>(value));</a:t>
+              </a:r>
+              <a:endParaRPr lang="ko-KR" altLang="en-US" sz="1600" dirty="0"/>
+            </a:p>
+          </p:txBody>
+        </p:sp>
+      </p:grpSp>
     </p:spTree>
     <p:extLst>
       <p:ext uri="{BB962C8B-B14F-4D97-AF65-F5344CB8AC3E}">
-        <p14:creationId xmlns:p14="http://schemas.microsoft.com/office/powerpoint/2010/main" val="1912358121"/>
+        <p14:creationId xmlns:p14="http://schemas.microsoft.com/office/powerpoint/2010/main" val="3983911550"/>
       </p:ext>
     </p:extLst>
   </p:cSld>
   <p:clrMapOvr>
     <a:masterClrMapping/>
   </p:clrMapOvr>
-  <p:timing>
-    <p:tnLst>
-      <p:par>
-        <p:cTn id="1" dur="indefinite" restart="never" nodeType="tmRoot"/>
-      </p:par>
-    </p:tnLst>
-  </p:timing>
 </p:sld>
 </file>
 

</xml_diff>

<commit_message>
update the image of monad
</commit_message>
<xml_diff>
--- a/FP.pptx
+++ b/FP.pptx
@@ -7,6 +7,7 @@
   <p:sldIdLst>
     <p:sldId id="257" r:id="rId2"/>
     <p:sldId id="258" r:id="rId3"/>
+    <p:sldId id="259" r:id="rId4"/>
   </p:sldIdLst>
   <p:sldSz cx="12192000" cy="6858000"/>
   <p:notesSz cx="6858000" cy="9144000"/>
@@ -244,7 +245,7 @@
           <a:p>
             <a:fld id="{70BF8FA9-73A0-4DC2-8E55-544D0BD59538}" type="datetimeFigureOut">
               <a:rPr lang="ko-KR" altLang="en-US" smtClean="0"/>
-              <a:t>2020-06-17</a:t>
+              <a:t>2020-06-18</a:t>
             </a:fld>
             <a:endParaRPr lang="ko-KR" altLang="en-US"/>
           </a:p>
@@ -414,7 +415,7 @@
           <a:p>
             <a:fld id="{70BF8FA9-73A0-4DC2-8E55-544D0BD59538}" type="datetimeFigureOut">
               <a:rPr lang="ko-KR" altLang="en-US" smtClean="0"/>
-              <a:t>2020-06-17</a:t>
+              <a:t>2020-06-18</a:t>
             </a:fld>
             <a:endParaRPr lang="ko-KR" altLang="en-US"/>
           </a:p>
@@ -594,7 +595,7 @@
           <a:p>
             <a:fld id="{70BF8FA9-73A0-4DC2-8E55-544D0BD59538}" type="datetimeFigureOut">
               <a:rPr lang="ko-KR" altLang="en-US" smtClean="0"/>
-              <a:t>2020-06-17</a:t>
+              <a:t>2020-06-18</a:t>
             </a:fld>
             <a:endParaRPr lang="ko-KR" altLang="en-US"/>
           </a:p>
@@ -764,7 +765,7 @@
           <a:p>
             <a:fld id="{70BF8FA9-73A0-4DC2-8E55-544D0BD59538}" type="datetimeFigureOut">
               <a:rPr lang="ko-KR" altLang="en-US" smtClean="0"/>
-              <a:t>2020-06-17</a:t>
+              <a:t>2020-06-18</a:t>
             </a:fld>
             <a:endParaRPr lang="ko-KR" altLang="en-US"/>
           </a:p>
@@ -1010,7 +1011,7 @@
           <a:p>
             <a:fld id="{70BF8FA9-73A0-4DC2-8E55-544D0BD59538}" type="datetimeFigureOut">
               <a:rPr lang="ko-KR" altLang="en-US" smtClean="0"/>
-              <a:t>2020-06-17</a:t>
+              <a:t>2020-06-18</a:t>
             </a:fld>
             <a:endParaRPr lang="ko-KR" altLang="en-US"/>
           </a:p>
@@ -1242,7 +1243,7 @@
           <a:p>
             <a:fld id="{70BF8FA9-73A0-4DC2-8E55-544D0BD59538}" type="datetimeFigureOut">
               <a:rPr lang="ko-KR" altLang="en-US" smtClean="0"/>
-              <a:t>2020-06-17</a:t>
+              <a:t>2020-06-18</a:t>
             </a:fld>
             <a:endParaRPr lang="ko-KR" altLang="en-US"/>
           </a:p>
@@ -1609,7 +1610,7 @@
           <a:p>
             <a:fld id="{70BF8FA9-73A0-4DC2-8E55-544D0BD59538}" type="datetimeFigureOut">
               <a:rPr lang="ko-KR" altLang="en-US" smtClean="0"/>
-              <a:t>2020-06-17</a:t>
+              <a:t>2020-06-18</a:t>
             </a:fld>
             <a:endParaRPr lang="ko-KR" altLang="en-US"/>
           </a:p>
@@ -1727,7 +1728,7 @@
           <a:p>
             <a:fld id="{70BF8FA9-73A0-4DC2-8E55-544D0BD59538}" type="datetimeFigureOut">
               <a:rPr lang="ko-KR" altLang="en-US" smtClean="0"/>
-              <a:t>2020-06-17</a:t>
+              <a:t>2020-06-18</a:t>
             </a:fld>
             <a:endParaRPr lang="ko-KR" altLang="en-US"/>
           </a:p>
@@ -1822,7 +1823,7 @@
           <a:p>
             <a:fld id="{70BF8FA9-73A0-4DC2-8E55-544D0BD59538}" type="datetimeFigureOut">
               <a:rPr lang="ko-KR" altLang="en-US" smtClean="0"/>
-              <a:t>2020-06-17</a:t>
+              <a:t>2020-06-18</a:t>
             </a:fld>
             <a:endParaRPr lang="ko-KR" altLang="en-US"/>
           </a:p>
@@ -2099,7 +2100,7 @@
           <a:p>
             <a:fld id="{70BF8FA9-73A0-4DC2-8E55-544D0BD59538}" type="datetimeFigureOut">
               <a:rPr lang="ko-KR" altLang="en-US" smtClean="0"/>
-              <a:t>2020-06-17</a:t>
+              <a:t>2020-06-18</a:t>
             </a:fld>
             <a:endParaRPr lang="ko-KR" altLang="en-US"/>
           </a:p>
@@ -2352,7 +2353,7 @@
           <a:p>
             <a:fld id="{70BF8FA9-73A0-4DC2-8E55-544D0BD59538}" type="datetimeFigureOut">
               <a:rPr lang="ko-KR" altLang="en-US" smtClean="0"/>
-              <a:t>2020-06-17</a:t>
+              <a:t>2020-06-18</a:t>
             </a:fld>
             <a:endParaRPr lang="ko-KR" altLang="en-US"/>
           </a:p>
@@ -2565,7 +2566,7 @@
           <a:p>
             <a:fld id="{70BF8FA9-73A0-4DC2-8E55-544D0BD59538}" type="datetimeFigureOut">
               <a:rPr lang="ko-KR" altLang="en-US" smtClean="0"/>
-              <a:t>2020-06-17</a:t>
+              <a:t>2020-06-18</a:t>
             </a:fld>
             <a:endParaRPr lang="ko-KR" altLang="en-US"/>
           </a:p>
@@ -4025,8 +4026,8 @@
           </a:p>
         </p:txBody>
       </p:sp>
-      <mc:AlternateContent xmlns:mc="http://schemas.openxmlformats.org/markup-compatibility/2006">
-        <mc:Choice xmlns:a14="http://schemas.microsoft.com/office/drawing/2010/main" Requires="a14">
+      <mc:AlternateContent xmlns:mc="http://schemas.openxmlformats.org/markup-compatibility/2006" xmlns:a14="http://schemas.microsoft.com/office/drawing/2010/main">
+        <mc:Choice Requires="a14">
           <p:sp>
             <p:nvSpPr>
               <p:cNvPr id="48" name="TextBox 47"/>
@@ -4072,7 +4073,7 @@
             </p:txBody>
           </p:sp>
         </mc:Choice>
-        <mc:Fallback>
+        <mc:Fallback xmlns="">
           <p:sp>
             <p:nvSpPr>
               <p:cNvPr id="48" name="TextBox 47"/>
@@ -4895,6 +4896,2009 @@
     <p:extLst>
       <p:ext uri="{BB962C8B-B14F-4D97-AF65-F5344CB8AC3E}">
         <p14:creationId xmlns:p14="http://schemas.microsoft.com/office/powerpoint/2010/main" val="3983911550"/>
+      </p:ext>
+    </p:extLst>
+  </p:cSld>
+  <p:clrMapOvr>
+    <a:masterClrMapping/>
+  </p:clrMapOvr>
+</p:sld>
+</file>
+
+<file path=ppt/slides/slide3.xml><?xml version="1.0" encoding="utf-8"?>
+<p:sld xmlns:a="http://schemas.openxmlformats.org/drawingml/2006/main" xmlns:r="http://schemas.openxmlformats.org/officeDocument/2006/relationships" xmlns:p="http://schemas.openxmlformats.org/presentationml/2006/main">
+  <p:cSld>
+    <p:spTree>
+      <p:nvGrpSpPr>
+        <p:cNvPr id="1" name=""/>
+        <p:cNvGrpSpPr/>
+        <p:nvPr/>
+      </p:nvGrpSpPr>
+      <p:grpSpPr>
+        <a:xfrm>
+          <a:off x="0" y="0"/>
+          <a:ext cx="0" cy="0"/>
+          <a:chOff x="0" y="0"/>
+          <a:chExt cx="0" cy="0"/>
+        </a:xfrm>
+      </p:grpSpPr>
+      <p:cxnSp>
+        <p:nvCxnSpPr>
+          <p:cNvPr id="19" name="직선 연결선 18"/>
+          <p:cNvCxnSpPr/>
+          <p:nvPr/>
+        </p:nvCxnSpPr>
+        <p:spPr>
+          <a:xfrm>
+            <a:off x="266700" y="3144414"/>
+            <a:ext cx="11658600" cy="0"/>
+          </a:xfrm>
+          <a:prstGeom prst="line">
+            <a:avLst/>
+          </a:prstGeom>
+          <a:ln w="19050">
+            <a:solidFill>
+              <a:schemeClr val="bg2"/>
+            </a:solidFill>
+            <a:prstDash val="sysDot"/>
+          </a:ln>
+        </p:spPr>
+        <p:style>
+          <a:lnRef idx="1">
+            <a:schemeClr val="accent1"/>
+          </a:lnRef>
+          <a:fillRef idx="0">
+            <a:schemeClr val="accent1"/>
+          </a:fillRef>
+          <a:effectRef idx="0">
+            <a:schemeClr val="accent1"/>
+          </a:effectRef>
+          <a:fontRef idx="minor">
+            <a:schemeClr val="tx1"/>
+          </a:fontRef>
+        </p:style>
+      </p:cxnSp>
+      <p:sp>
+        <p:nvSpPr>
+          <p:cNvPr id="60" name="TextBox 59"/>
+          <p:cNvSpPr txBox="1"/>
+          <p:nvPr/>
+        </p:nvSpPr>
+        <p:spPr>
+          <a:xfrm>
+            <a:off x="5613597" y="1972949"/>
+            <a:ext cx="364202" cy="246221"/>
+          </a:xfrm>
+          <a:prstGeom prst="rect">
+            <a:avLst/>
+          </a:prstGeom>
+          <a:noFill/>
+        </p:spPr>
+        <p:txBody>
+          <a:bodyPr wrap="none" rtlCol="0">
+            <a:spAutoFit/>
+          </a:bodyPr>
+          <a:lstStyle/>
+          <a:p>
+            <a:r>
+              <a:rPr lang="en-US" altLang="ko-KR" sz="1000" b="1" i="1" smtClean="0">
+                <a:solidFill>
+                  <a:srgbClr val="C00000"/>
+                </a:solidFill>
+              </a:rPr>
+              <a:t>Vs.</a:t>
+            </a:r>
+            <a:endParaRPr lang="ko-KR" altLang="en-US" sz="1000" b="1" i="1">
+              <a:solidFill>
+                <a:srgbClr val="C00000"/>
+              </a:solidFill>
+            </a:endParaRPr>
+          </a:p>
+        </p:txBody>
+      </p:sp>
+      <p:grpSp>
+        <p:nvGrpSpPr>
+          <p:cNvPr id="25" name="그룹 24"/>
+          <p:cNvGrpSpPr/>
+          <p:nvPr/>
+        </p:nvGrpSpPr>
+        <p:grpSpPr>
+          <a:xfrm>
+            <a:off x="1226913" y="1010907"/>
+            <a:ext cx="4150538" cy="1654285"/>
+            <a:chOff x="441469" y="1031101"/>
+            <a:chExt cx="4150538" cy="1654285"/>
+          </a:xfrm>
+        </p:grpSpPr>
+        <p:sp>
+          <p:nvSpPr>
+            <p:cNvPr id="61" name="TextBox 60"/>
+            <p:cNvSpPr txBox="1"/>
+            <p:nvPr/>
+          </p:nvSpPr>
+          <p:spPr>
+            <a:xfrm>
+              <a:off x="2179004" y="1031101"/>
+              <a:ext cx="676788" cy="369332"/>
+            </a:xfrm>
+            <a:prstGeom prst="rect">
+              <a:avLst/>
+            </a:prstGeom>
+            <a:noFill/>
+          </p:spPr>
+          <p:txBody>
+            <a:bodyPr wrap="none" rtlCol="0">
+              <a:spAutoFit/>
+            </a:bodyPr>
+            <a:lstStyle/>
+            <a:p>
+              <a:r>
+                <a:rPr lang="en-US" altLang="ko-KR" b="1" smtClean="0"/>
+                <a:t>Map</a:t>
+              </a:r>
+              <a:endParaRPr lang="ko-KR" altLang="en-US" b="1"/>
+            </a:p>
+          </p:txBody>
+        </p:sp>
+        <p:grpSp>
+          <p:nvGrpSpPr>
+            <p:cNvPr id="8" name="그룹 7"/>
+            <p:cNvGrpSpPr/>
+            <p:nvPr/>
+          </p:nvGrpSpPr>
+          <p:grpSpPr>
+            <a:xfrm>
+              <a:off x="441469" y="1545944"/>
+              <a:ext cx="4150538" cy="1139442"/>
+              <a:chOff x="441469" y="1545944"/>
+              <a:chExt cx="4150538" cy="1139442"/>
+            </a:xfrm>
+          </p:grpSpPr>
+          <p:sp>
+            <p:nvSpPr>
+              <p:cNvPr id="18" name="직사각형 17"/>
+              <p:cNvSpPr/>
+              <p:nvPr/>
+            </p:nvSpPr>
+            <p:spPr>
+              <a:xfrm>
+                <a:off x="441469" y="1900254"/>
+                <a:ext cx="972000" cy="432000"/>
+              </a:xfrm>
+              <a:prstGeom prst="rect">
+                <a:avLst/>
+              </a:prstGeom>
+              <a:solidFill>
+                <a:srgbClr val="FFF5D9"/>
+              </a:solidFill>
+              <a:ln w="28575">
+                <a:solidFill>
+                  <a:srgbClr val="0070C0"/>
+                </a:solidFill>
+              </a:ln>
+            </p:spPr>
+            <p:style>
+              <a:lnRef idx="2">
+                <a:schemeClr val="dk1"/>
+              </a:lnRef>
+              <a:fillRef idx="1">
+                <a:schemeClr val="lt1"/>
+              </a:fillRef>
+              <a:effectRef idx="0">
+                <a:schemeClr val="dk1"/>
+              </a:effectRef>
+              <a:fontRef idx="minor">
+                <a:schemeClr val="dk1"/>
+              </a:fontRef>
+            </p:style>
+            <p:txBody>
+              <a:bodyPr rtlCol="0" anchor="ctr"/>
+              <a:lstStyle/>
+              <a:p>
+                <a:pPr algn="ctr"/>
+                <a:r>
+                  <a:rPr lang="en-US" altLang="ko-KR" sz="1100" b="1" smtClean="0">
+                    <a:solidFill>
+                      <a:srgbClr val="0070C0"/>
+                    </a:solidFill>
+                  </a:rPr>
+                  <a:t>int</a:t>
+                </a:r>
+                <a:endParaRPr lang="ko-KR" altLang="en-US" sz="1100" b="1" dirty="0">
+                  <a:solidFill>
+                    <a:srgbClr val="0070C0"/>
+                  </a:solidFill>
+                </a:endParaRPr>
+              </a:p>
+            </p:txBody>
+          </p:sp>
+          <p:sp>
+            <p:nvSpPr>
+              <p:cNvPr id="22" name="직사각형 21"/>
+              <p:cNvSpPr/>
+              <p:nvPr/>
+            </p:nvSpPr>
+            <p:spPr>
+              <a:xfrm>
+                <a:off x="3620007" y="1900254"/>
+                <a:ext cx="972000" cy="432000"/>
+              </a:xfrm>
+              <a:prstGeom prst="rect">
+                <a:avLst/>
+              </a:prstGeom>
+              <a:solidFill>
+                <a:srgbClr val="FFF5D9"/>
+              </a:solidFill>
+              <a:ln w="28575">
+                <a:solidFill>
+                  <a:srgbClr val="0070C0"/>
+                </a:solidFill>
+              </a:ln>
+            </p:spPr>
+            <p:style>
+              <a:lnRef idx="2">
+                <a:schemeClr val="dk1"/>
+              </a:lnRef>
+              <a:fillRef idx="1">
+                <a:schemeClr val="lt1"/>
+              </a:fillRef>
+              <a:effectRef idx="0">
+                <a:schemeClr val="dk1"/>
+              </a:effectRef>
+              <a:fontRef idx="minor">
+                <a:schemeClr val="dk1"/>
+              </a:fontRef>
+            </p:style>
+            <p:txBody>
+              <a:bodyPr rtlCol="0" anchor="ctr"/>
+              <a:lstStyle/>
+              <a:p>
+                <a:pPr algn="ctr"/>
+                <a:r>
+                  <a:rPr lang="en-US" altLang="ko-KR" sz="1100" b="1" smtClean="0">
+                    <a:solidFill>
+                      <a:srgbClr val="0070C0"/>
+                    </a:solidFill>
+                  </a:rPr>
+                  <a:t>double</a:t>
+                </a:r>
+                <a:endParaRPr lang="ko-KR" altLang="en-US" sz="1100" b="1" dirty="0">
+                  <a:solidFill>
+                    <a:srgbClr val="0070C0"/>
+                  </a:solidFill>
+                </a:endParaRPr>
+              </a:p>
+            </p:txBody>
+          </p:sp>
+          <p:cxnSp>
+            <p:nvCxnSpPr>
+              <p:cNvPr id="26" name="직선 화살표 연결선 25"/>
+              <p:cNvCxnSpPr>
+                <a:stCxn id="21" idx="3"/>
+                <a:endCxn id="33" idx="1"/>
+              </p:cNvCxnSpPr>
+              <p:nvPr/>
+            </p:nvCxnSpPr>
+            <p:spPr>
+              <a:xfrm>
+                <a:off x="2183380" y="2116254"/>
+                <a:ext cx="672412" cy="0"/>
+              </a:xfrm>
+              <a:prstGeom prst="straightConnector1">
+                <a:avLst/>
+              </a:prstGeom>
+              <a:ln w="38100">
+                <a:tailEnd type="triangle"/>
+              </a:ln>
+            </p:spPr>
+            <p:style>
+              <a:lnRef idx="3">
+                <a:schemeClr val="dk1"/>
+              </a:lnRef>
+              <a:fillRef idx="0">
+                <a:schemeClr val="dk1"/>
+              </a:fillRef>
+              <a:effectRef idx="2">
+                <a:schemeClr val="dk1"/>
+              </a:effectRef>
+              <a:fontRef idx="minor">
+                <a:schemeClr val="tx1"/>
+              </a:fontRef>
+            </p:style>
+          </p:cxnSp>
+          <mc:AlternateContent xmlns:mc="http://schemas.openxmlformats.org/markup-compatibility/2006">
+            <mc:Choice xmlns:a14="http://schemas.microsoft.com/office/drawing/2010/main" Requires="a14">
+              <p:sp>
+                <p:nvSpPr>
+                  <p:cNvPr id="27" name="TextBox 26"/>
+                  <p:cNvSpPr txBox="1"/>
+                  <p:nvPr/>
+                </p:nvSpPr>
+                <p:spPr>
+                  <a:xfrm>
+                    <a:off x="2402567" y="1545944"/>
+                    <a:ext cx="234038" cy="307777"/>
+                  </a:xfrm>
+                  <a:prstGeom prst="rect">
+                    <a:avLst/>
+                  </a:prstGeom>
+                  <a:noFill/>
+                </p:spPr>
+                <p:txBody>
+                  <a:bodyPr wrap="none" lIns="0" tIns="0" rIns="0" bIns="0" rtlCol="0">
+                    <a:spAutoFit/>
+                  </a:bodyPr>
+                  <a:lstStyle/>
+                  <a:p>
+                    <a:pPr/>
+                    <a14:m>
+                      <m:oMathPara xmlns:m="http://schemas.openxmlformats.org/officeDocument/2006/math">
+                        <m:oMathParaPr>
+                          <m:jc m:val="centerGroup"/>
+                        </m:oMathParaPr>
+                        <m:oMath xmlns:m="http://schemas.openxmlformats.org/officeDocument/2006/math">
+                          <m:r>
+                            <a:rPr lang="pt-BR" altLang="ko-KR" sz="2000" b="1" i="1" smtClean="0">
+                              <a:latin typeface="Cambria Math" panose="02040503050406030204" pitchFamily="18" charset="0"/>
+                            </a:rPr>
+                            <m:t>𝒇</m:t>
+                          </m:r>
+                        </m:oMath>
+                      </m:oMathPara>
+                    </a14:m>
+                    <a:endParaRPr lang="ko-KR" altLang="en-US" sz="2000" b="1">
+                      <a:latin typeface="+mn-ea"/>
+                    </a:endParaRPr>
+                  </a:p>
+                </p:txBody>
+              </p:sp>
+            </mc:Choice>
+            <mc:Fallback>
+              <p:sp>
+                <p:nvSpPr>
+                  <p:cNvPr id="27" name="TextBox 26"/>
+                  <p:cNvSpPr txBox="1">
+                    <a:spLocks noRot="1" noChangeAspect="1" noMove="1" noResize="1" noEditPoints="1" noAdjustHandles="1" noChangeArrowheads="1" noChangeShapeType="1" noTextEdit="1"/>
+                  </p:cNvSpPr>
+                  <p:nvPr/>
+                </p:nvSpPr>
+                <p:spPr>
+                  <a:xfrm>
+                    <a:off x="2402567" y="1545944"/>
+                    <a:ext cx="234038" cy="307777"/>
+                  </a:xfrm>
+                  <a:prstGeom prst="rect">
+                    <a:avLst/>
+                  </a:prstGeom>
+                  <a:blipFill rotWithShape="0">
+                    <a:blip r:embed="rId2"/>
+                    <a:stretch>
+                      <a:fillRect l="-34211" r="-31579" b="-37255"/>
+                    </a:stretch>
+                  </a:blipFill>
+                </p:spPr>
+                <p:txBody>
+                  <a:bodyPr/>
+                  <a:lstStyle/>
+                  <a:p>
+                    <a:r>
+                      <a:rPr lang="ko-KR" altLang="en-US">
+                        <a:noFill/>
+                      </a:rPr>
+                      <a:t> </a:t>
+                    </a:r>
+                  </a:p>
+                </p:txBody>
+              </p:sp>
+            </mc:Fallback>
+          </mc:AlternateContent>
+          <p:sp>
+            <p:nvSpPr>
+              <p:cNvPr id="21" name="직사각형 20"/>
+              <p:cNvSpPr/>
+              <p:nvPr/>
+            </p:nvSpPr>
+            <p:spPr>
+              <a:xfrm>
+                <a:off x="1535380" y="1936254"/>
+                <a:ext cx="648000" cy="360000"/>
+              </a:xfrm>
+              <a:prstGeom prst="rect">
+                <a:avLst/>
+              </a:prstGeom>
+              <a:solidFill>
+                <a:schemeClr val="bg1"/>
+              </a:solidFill>
+              <a:ln w="12700">
+                <a:solidFill>
+                  <a:schemeClr val="bg1">
+                    <a:lumMod val="85000"/>
+                  </a:schemeClr>
+                </a:solidFill>
+                <a:prstDash val="dash"/>
+              </a:ln>
+            </p:spPr>
+            <p:style>
+              <a:lnRef idx="2">
+                <a:schemeClr val="dk1"/>
+              </a:lnRef>
+              <a:fillRef idx="1">
+                <a:schemeClr val="lt1"/>
+              </a:fillRef>
+              <a:effectRef idx="0">
+                <a:schemeClr val="dk1"/>
+              </a:effectRef>
+              <a:fontRef idx="minor">
+                <a:schemeClr val="dk1"/>
+              </a:fontRef>
+            </p:style>
+            <p:txBody>
+              <a:bodyPr rtlCol="0" anchor="ctr"/>
+              <a:lstStyle/>
+              <a:p>
+                <a:pPr algn="ctr"/>
+                <a:r>
+                  <a:rPr lang="en-US" altLang="ko-KR" sz="1000" b="1" smtClean="0">
+                    <a:solidFill>
+                      <a:srgbClr val="0070C0"/>
+                    </a:solidFill>
+                  </a:rPr>
+                  <a:t>int</a:t>
+                </a:r>
+                <a:endParaRPr lang="ko-KR" altLang="en-US" sz="1000" b="1" dirty="0">
+                  <a:solidFill>
+                    <a:srgbClr val="0070C0"/>
+                  </a:solidFill>
+                </a:endParaRPr>
+              </a:p>
+            </p:txBody>
+          </p:sp>
+          <p:sp>
+            <p:nvSpPr>
+              <p:cNvPr id="33" name="직사각형 32"/>
+              <p:cNvSpPr/>
+              <p:nvPr/>
+            </p:nvSpPr>
+            <p:spPr>
+              <a:xfrm>
+                <a:off x="2855792" y="1936254"/>
+                <a:ext cx="648000" cy="360000"/>
+              </a:xfrm>
+              <a:prstGeom prst="rect">
+                <a:avLst/>
+              </a:prstGeom>
+              <a:solidFill>
+                <a:schemeClr val="bg1"/>
+              </a:solidFill>
+              <a:ln w="12700">
+                <a:solidFill>
+                  <a:schemeClr val="bg1">
+                    <a:lumMod val="85000"/>
+                  </a:schemeClr>
+                </a:solidFill>
+                <a:prstDash val="dash"/>
+              </a:ln>
+            </p:spPr>
+            <p:style>
+              <a:lnRef idx="2">
+                <a:schemeClr val="dk1"/>
+              </a:lnRef>
+              <a:fillRef idx="1">
+                <a:schemeClr val="lt1"/>
+              </a:fillRef>
+              <a:effectRef idx="0">
+                <a:schemeClr val="dk1"/>
+              </a:effectRef>
+              <a:fontRef idx="minor">
+                <a:schemeClr val="dk1"/>
+              </a:fontRef>
+            </p:style>
+            <p:txBody>
+              <a:bodyPr rtlCol="0" anchor="ctr"/>
+              <a:lstStyle/>
+              <a:p>
+                <a:pPr algn="ctr"/>
+                <a:r>
+                  <a:rPr lang="en-US" altLang="ko-KR" sz="1000" b="1" smtClean="0">
+                    <a:solidFill>
+                      <a:srgbClr val="0070C0"/>
+                    </a:solidFill>
+                  </a:rPr>
+                  <a:t>double</a:t>
+                </a:r>
+                <a:endParaRPr lang="ko-KR" altLang="en-US" sz="1000" b="1" dirty="0">
+                  <a:solidFill>
+                    <a:srgbClr val="0070C0"/>
+                  </a:solidFill>
+                </a:endParaRPr>
+              </a:p>
+            </p:txBody>
+          </p:sp>
+          <p:sp>
+            <p:nvSpPr>
+              <p:cNvPr id="37" name="위쪽 화살표 36"/>
+              <p:cNvSpPr/>
+              <p:nvPr/>
+            </p:nvSpPr>
+            <p:spPr>
+              <a:xfrm rot="5400000">
+                <a:off x="3392092" y="1964858"/>
+                <a:ext cx="339616" cy="302793"/>
+              </a:xfrm>
+              <a:prstGeom prst="upArrow">
+                <a:avLst>
+                  <a:gd name="adj1" fmla="val 63636"/>
+                  <a:gd name="adj2" fmla="val 59091"/>
+                </a:avLst>
+              </a:prstGeom>
+              <a:solidFill>
+                <a:srgbClr val="0070C0"/>
+              </a:solidFill>
+              <a:ln w="28575">
+                <a:solidFill>
+                  <a:schemeClr val="bg1"/>
+                </a:solidFill>
+              </a:ln>
+            </p:spPr>
+            <p:style>
+              <a:lnRef idx="2">
+                <a:schemeClr val="accent1">
+                  <a:shade val="50000"/>
+                </a:schemeClr>
+              </a:lnRef>
+              <a:fillRef idx="1">
+                <a:schemeClr val="accent1"/>
+              </a:fillRef>
+              <a:effectRef idx="0">
+                <a:schemeClr val="accent1"/>
+              </a:effectRef>
+              <a:fontRef idx="minor">
+                <a:schemeClr val="lt1"/>
+              </a:fontRef>
+            </p:style>
+            <p:txBody>
+              <a:bodyPr rtlCol="0" anchor="ctr"/>
+              <a:lstStyle/>
+              <a:p>
+                <a:pPr algn="ctr"/>
+                <a:endParaRPr lang="ko-KR" altLang="en-US" sz="1400"/>
+              </a:p>
+            </p:txBody>
+          </p:sp>
+          <p:sp>
+            <p:nvSpPr>
+              <p:cNvPr id="39" name="TextBox 38"/>
+              <p:cNvSpPr txBox="1"/>
+              <p:nvPr/>
+            </p:nvSpPr>
+            <p:spPr>
+              <a:xfrm>
+                <a:off x="508124" y="2423776"/>
+                <a:ext cx="838691" cy="261610"/>
+              </a:xfrm>
+              <a:prstGeom prst="rect">
+                <a:avLst/>
+              </a:prstGeom>
+              <a:noFill/>
+            </p:spPr>
+            <p:txBody>
+              <a:bodyPr wrap="none" rtlCol="0">
+                <a:spAutoFit/>
+              </a:bodyPr>
+              <a:lstStyle/>
+              <a:p>
+                <a:r>
+                  <a:rPr lang="en-US" altLang="ko-KR" sz="1100" b="1" smtClean="0">
+                    <a:solidFill>
+                      <a:srgbClr val="0070C0"/>
+                    </a:solidFill>
+                  </a:rPr>
+                  <a:t>Container</a:t>
+                </a:r>
+                <a:endParaRPr lang="ko-KR" altLang="en-US" sz="1100" b="1">
+                  <a:solidFill>
+                    <a:srgbClr val="0070C0"/>
+                  </a:solidFill>
+                </a:endParaRPr>
+              </a:p>
+            </p:txBody>
+          </p:sp>
+          <p:sp>
+            <p:nvSpPr>
+              <p:cNvPr id="41" name="TextBox 40"/>
+              <p:cNvSpPr txBox="1"/>
+              <p:nvPr/>
+            </p:nvSpPr>
+            <p:spPr>
+              <a:xfrm>
+                <a:off x="3686662" y="2423776"/>
+                <a:ext cx="838691" cy="261610"/>
+              </a:xfrm>
+              <a:prstGeom prst="rect">
+                <a:avLst/>
+              </a:prstGeom>
+              <a:noFill/>
+            </p:spPr>
+            <p:txBody>
+              <a:bodyPr wrap="none" rtlCol="0">
+                <a:spAutoFit/>
+              </a:bodyPr>
+              <a:lstStyle/>
+              <a:p>
+                <a:r>
+                  <a:rPr lang="en-US" altLang="ko-KR" sz="1100" b="1" smtClean="0">
+                    <a:solidFill>
+                      <a:srgbClr val="0070C0"/>
+                    </a:solidFill>
+                  </a:rPr>
+                  <a:t>Container</a:t>
+                </a:r>
+                <a:endParaRPr lang="ko-KR" altLang="en-US" sz="1100" b="1">
+                  <a:solidFill>
+                    <a:srgbClr val="0070C0"/>
+                  </a:solidFill>
+                </a:endParaRPr>
+              </a:p>
+            </p:txBody>
+          </p:sp>
+          <p:sp>
+            <p:nvSpPr>
+              <p:cNvPr id="20" name="위쪽 화살표 19"/>
+              <p:cNvSpPr/>
+              <p:nvPr/>
+            </p:nvSpPr>
+            <p:spPr>
+              <a:xfrm rot="5400000">
+                <a:off x="1304617" y="1964858"/>
+                <a:ext cx="339616" cy="302793"/>
+              </a:xfrm>
+              <a:prstGeom prst="upArrow">
+                <a:avLst>
+                  <a:gd name="adj1" fmla="val 63636"/>
+                  <a:gd name="adj2" fmla="val 59091"/>
+                </a:avLst>
+              </a:prstGeom>
+              <a:solidFill>
+                <a:srgbClr val="0070C0"/>
+              </a:solidFill>
+              <a:ln w="28575">
+                <a:solidFill>
+                  <a:schemeClr val="bg1"/>
+                </a:solidFill>
+              </a:ln>
+            </p:spPr>
+            <p:style>
+              <a:lnRef idx="2">
+                <a:schemeClr val="accent1">
+                  <a:shade val="50000"/>
+                </a:schemeClr>
+              </a:lnRef>
+              <a:fillRef idx="1">
+                <a:schemeClr val="accent1"/>
+              </a:fillRef>
+              <a:effectRef idx="0">
+                <a:schemeClr val="accent1"/>
+              </a:effectRef>
+              <a:fontRef idx="minor">
+                <a:schemeClr val="lt1"/>
+              </a:fontRef>
+            </p:style>
+            <p:txBody>
+              <a:bodyPr rtlCol="0" anchor="ctr"/>
+              <a:lstStyle/>
+              <a:p>
+                <a:pPr algn="ctr"/>
+                <a:endParaRPr lang="ko-KR" altLang="en-US" sz="1400"/>
+              </a:p>
+            </p:txBody>
+          </p:sp>
+        </p:grpSp>
+      </p:grpSp>
+      <p:grpSp>
+        <p:nvGrpSpPr>
+          <p:cNvPr id="29" name="그룹 28"/>
+          <p:cNvGrpSpPr/>
+          <p:nvPr/>
+        </p:nvGrpSpPr>
+        <p:grpSpPr>
+          <a:xfrm>
+            <a:off x="1712548" y="4224117"/>
+            <a:ext cx="3179268" cy="1622977"/>
+            <a:chOff x="1736224" y="3681606"/>
+            <a:chExt cx="3179268" cy="1622977"/>
+          </a:xfrm>
+        </p:grpSpPr>
+        <p:sp>
+          <p:nvSpPr>
+            <p:cNvPr id="66" name="직사각형 65"/>
+            <p:cNvSpPr/>
+            <p:nvPr/>
+          </p:nvSpPr>
+          <p:spPr>
+            <a:xfrm>
+              <a:off x="3145614" y="4767215"/>
+              <a:ext cx="430823" cy="537368"/>
+            </a:xfrm>
+            <a:prstGeom prst="rect">
+              <a:avLst/>
+            </a:prstGeom>
+            <a:solidFill>
+              <a:schemeClr val="accent4">
+                <a:lumMod val="20000"/>
+                <a:lumOff val="80000"/>
+              </a:schemeClr>
+            </a:solidFill>
+            <a:ln>
+              <a:solidFill>
+                <a:schemeClr val="accent4">
+                  <a:lumMod val="20000"/>
+                  <a:lumOff val="80000"/>
+                </a:schemeClr>
+              </a:solidFill>
+            </a:ln>
+          </p:spPr>
+          <p:style>
+            <a:lnRef idx="2">
+              <a:schemeClr val="accent1">
+                <a:shade val="50000"/>
+              </a:schemeClr>
+            </a:lnRef>
+            <a:fillRef idx="1">
+              <a:schemeClr val="accent1"/>
+            </a:fillRef>
+            <a:effectRef idx="0">
+              <a:schemeClr val="accent1"/>
+            </a:effectRef>
+            <a:fontRef idx="minor">
+              <a:schemeClr val="lt1"/>
+            </a:fontRef>
+          </p:style>
+          <p:txBody>
+            <a:bodyPr rtlCol="0" anchor="ctr"/>
+            <a:lstStyle/>
+            <a:p>
+              <a:pPr algn="ctr"/>
+              <a:endParaRPr lang="ko-KR" altLang="en-US" sz="1400"/>
+            </a:p>
+          </p:txBody>
+        </p:sp>
+        <p:sp>
+          <p:nvSpPr>
+            <p:cNvPr id="63" name="TextBox 62"/>
+            <p:cNvSpPr txBox="1"/>
+            <p:nvPr/>
+          </p:nvSpPr>
+          <p:spPr>
+            <a:xfrm>
+              <a:off x="1736224" y="3681606"/>
+              <a:ext cx="3179268" cy="1523494"/>
+            </a:xfrm>
+            <a:prstGeom prst="rect">
+              <a:avLst/>
+            </a:prstGeom>
+            <a:noFill/>
+          </p:spPr>
+          <p:txBody>
+            <a:bodyPr wrap="none" rtlCol="0">
+              <a:spAutoFit/>
+            </a:bodyPr>
+            <a:lstStyle/>
+            <a:p>
+              <a:pPr>
+                <a:lnSpc>
+                  <a:spcPct val="150000"/>
+                </a:lnSpc>
+              </a:pPr>
+              <a:r>
+                <a:rPr lang="en-US" altLang="ko-KR" sz="1100" b="1" dirty="0" smtClean="0"/>
+                <a:t>double</a:t>
+              </a:r>
+              <a:r>
+                <a:rPr lang="en-US" altLang="ko-KR" sz="1100" dirty="0" smtClean="0"/>
+                <a:t> </a:t>
+              </a:r>
+              <a:r>
+                <a:rPr lang="en-US" altLang="ko-KR" sz="1600" b="1" dirty="0" smtClean="0"/>
+                <a:t>f</a:t>
+              </a:r>
+              <a:r>
+                <a:rPr lang="en-US" altLang="ko-KR" sz="1100" dirty="0" smtClean="0"/>
+                <a:t>(</a:t>
+              </a:r>
+              <a:r>
+                <a:rPr lang="en-US" altLang="ko-KR" sz="1100" b="1" dirty="0" err="1" smtClean="0"/>
+                <a:t>int</a:t>
+              </a:r>
+              <a:r>
+                <a:rPr lang="en-US" altLang="ko-KR" sz="1100" dirty="0" smtClean="0"/>
+                <a:t> value)</a:t>
+              </a:r>
+            </a:p>
+            <a:p>
+              <a:r>
+                <a:rPr lang="en-US" altLang="ko-KR" sz="1100" dirty="0" smtClean="0"/>
+                <a:t>{</a:t>
+              </a:r>
+            </a:p>
+            <a:p>
+              <a:r>
+                <a:rPr lang="en-US" altLang="ko-KR" sz="1100" dirty="0" smtClean="0"/>
+                <a:t>      …</a:t>
+              </a:r>
+            </a:p>
+            <a:p>
+              <a:r>
+                <a:rPr lang="en-US" altLang="ko-KR" sz="1100" dirty="0" smtClean="0"/>
+                <a:t>}</a:t>
+              </a:r>
+            </a:p>
+            <a:p>
+              <a:endParaRPr lang="en-US" altLang="ko-KR" sz="1100" smtClean="0"/>
+            </a:p>
+            <a:p>
+              <a:r>
+                <a:rPr lang="en-US" altLang="ko-KR" sz="1100" b="1" smtClean="0">
+                  <a:solidFill>
+                    <a:srgbClr val="0070C0"/>
+                  </a:solidFill>
+                </a:rPr>
+                <a:t>A&lt;</a:t>
+              </a:r>
+              <a:r>
+                <a:rPr lang="en-US" altLang="ko-KR" sz="1100" smtClean="0"/>
+                <a:t>int</a:t>
+              </a:r>
+              <a:r>
+                <a:rPr lang="en-US" altLang="ko-KR" sz="1100" b="1" smtClean="0">
+                  <a:solidFill>
+                    <a:srgbClr val="0070C0"/>
+                  </a:solidFill>
+                </a:rPr>
+                <a:t>&gt;</a:t>
+              </a:r>
+              <a:r>
+                <a:rPr lang="en-US" altLang="ko-KR" sz="1100" smtClean="0"/>
+                <a:t> xyz = …;</a:t>
+              </a:r>
+              <a:endParaRPr lang="en-US" altLang="ko-KR" sz="1100" dirty="0"/>
+            </a:p>
+            <a:p>
+              <a:r>
+                <a:rPr lang="en-US" altLang="ko-KR" sz="1100" b="1" smtClean="0">
+                  <a:solidFill>
+                    <a:srgbClr val="0070C0"/>
+                  </a:solidFill>
+                </a:rPr>
+                <a:t>A&lt;</a:t>
+              </a:r>
+              <a:r>
+                <a:rPr lang="en-US" altLang="ko-KR" sz="1100" smtClean="0"/>
+                <a:t>double</a:t>
+              </a:r>
+              <a:r>
+                <a:rPr lang="en-US" altLang="ko-KR" sz="1100" b="1" smtClean="0">
+                  <a:solidFill>
+                    <a:srgbClr val="0070C0"/>
+                  </a:solidFill>
+                </a:rPr>
+                <a:t>&gt;</a:t>
+              </a:r>
+              <a:r>
+                <a:rPr lang="en-US" altLang="ko-KR" sz="1100" smtClean="0"/>
+                <a:t> ret = xyz.</a:t>
+              </a:r>
+              <a:r>
+                <a:rPr lang="en-US" altLang="ko-KR" sz="1100" b="1" smtClean="0">
+                  <a:solidFill>
+                    <a:srgbClr val="C00000"/>
+                  </a:solidFill>
+                </a:rPr>
+                <a:t>Map</a:t>
+              </a:r>
+              <a:r>
+                <a:rPr lang="en-US" altLang="ko-KR" sz="1100" smtClean="0"/>
+                <a:t>(value </a:t>
+              </a:r>
+              <a:r>
+                <a:rPr lang="en-US" altLang="ko-KR" sz="1100" dirty="0" smtClean="0"/>
+                <a:t>=&gt;</a:t>
+              </a:r>
+              <a:r>
+                <a:rPr lang="en-US" altLang="ko-KR" sz="1200" dirty="0" smtClean="0"/>
+                <a:t> </a:t>
+              </a:r>
+              <a:r>
+                <a:rPr lang="en-US" altLang="ko-KR" sz="1200" b="1" dirty="0" smtClean="0"/>
+                <a:t>f</a:t>
+              </a:r>
+              <a:r>
+                <a:rPr lang="en-US" altLang="ko-KR" sz="1100" dirty="0" smtClean="0"/>
+                <a:t>(value));</a:t>
+              </a:r>
+              <a:endParaRPr lang="ko-KR" altLang="en-US" sz="1200" dirty="0"/>
+            </a:p>
+          </p:txBody>
+        </p:sp>
+      </p:grpSp>
+      <p:grpSp>
+        <p:nvGrpSpPr>
+          <p:cNvPr id="24" name="그룹 23"/>
+          <p:cNvGrpSpPr/>
+          <p:nvPr/>
+        </p:nvGrpSpPr>
+        <p:grpSpPr>
+          <a:xfrm>
+            <a:off x="6213945" y="1010907"/>
+            <a:ext cx="3386323" cy="1654285"/>
+            <a:chOff x="5377037" y="1031101"/>
+            <a:chExt cx="3386323" cy="1654285"/>
+          </a:xfrm>
+        </p:grpSpPr>
+        <p:sp>
+          <p:nvSpPr>
+            <p:cNvPr id="40" name="TextBox 39"/>
+            <p:cNvSpPr txBox="1"/>
+            <p:nvPr/>
+          </p:nvSpPr>
+          <p:spPr>
+            <a:xfrm>
+              <a:off x="6729400" y="1031101"/>
+              <a:ext cx="681597" cy="369332"/>
+            </a:xfrm>
+            <a:prstGeom prst="rect">
+              <a:avLst/>
+            </a:prstGeom>
+            <a:noFill/>
+          </p:spPr>
+          <p:txBody>
+            <a:bodyPr wrap="none" rtlCol="0">
+              <a:spAutoFit/>
+            </a:bodyPr>
+            <a:lstStyle/>
+            <a:p>
+              <a:r>
+                <a:rPr lang="en-US" altLang="ko-KR" b="1" smtClean="0"/>
+                <a:t>Bind</a:t>
+              </a:r>
+              <a:endParaRPr lang="ko-KR" altLang="en-US" b="1"/>
+            </a:p>
+          </p:txBody>
+        </p:sp>
+        <p:grpSp>
+          <p:nvGrpSpPr>
+            <p:cNvPr id="10" name="그룹 9"/>
+            <p:cNvGrpSpPr/>
+            <p:nvPr/>
+          </p:nvGrpSpPr>
+          <p:grpSpPr>
+            <a:xfrm>
+              <a:off x="5377037" y="1545944"/>
+              <a:ext cx="3386323" cy="1139442"/>
+              <a:chOff x="5377037" y="1545944"/>
+              <a:chExt cx="3386323" cy="1139442"/>
+            </a:xfrm>
+          </p:grpSpPr>
+          <p:sp>
+            <p:nvSpPr>
+              <p:cNvPr id="43" name="직사각형 42"/>
+              <p:cNvSpPr/>
+              <p:nvPr/>
+            </p:nvSpPr>
+            <p:spPr>
+              <a:xfrm>
+                <a:off x="5377037" y="1900254"/>
+                <a:ext cx="972000" cy="432000"/>
+              </a:xfrm>
+              <a:prstGeom prst="rect">
+                <a:avLst/>
+              </a:prstGeom>
+              <a:solidFill>
+                <a:srgbClr val="FFF5D9"/>
+              </a:solidFill>
+              <a:ln w="28575">
+                <a:solidFill>
+                  <a:srgbClr val="0070C0"/>
+                </a:solidFill>
+              </a:ln>
+            </p:spPr>
+            <p:style>
+              <a:lnRef idx="2">
+                <a:schemeClr val="dk1"/>
+              </a:lnRef>
+              <a:fillRef idx="1">
+                <a:schemeClr val="lt1"/>
+              </a:fillRef>
+              <a:effectRef idx="0">
+                <a:schemeClr val="dk1"/>
+              </a:effectRef>
+              <a:fontRef idx="minor">
+                <a:schemeClr val="dk1"/>
+              </a:fontRef>
+            </p:style>
+            <p:txBody>
+              <a:bodyPr rtlCol="0" anchor="ctr"/>
+              <a:lstStyle/>
+              <a:p>
+                <a:pPr algn="ctr"/>
+                <a:r>
+                  <a:rPr lang="en-US" altLang="ko-KR" sz="1100" b="1" smtClean="0">
+                    <a:solidFill>
+                      <a:srgbClr val="0070C0"/>
+                    </a:solidFill>
+                  </a:rPr>
+                  <a:t>int</a:t>
+                </a:r>
+                <a:endParaRPr lang="ko-KR" altLang="en-US" sz="1100" b="1" dirty="0">
+                  <a:solidFill>
+                    <a:srgbClr val="0070C0"/>
+                  </a:solidFill>
+                </a:endParaRPr>
+              </a:p>
+            </p:txBody>
+          </p:sp>
+          <p:sp>
+            <p:nvSpPr>
+              <p:cNvPr id="50" name="직사각형 49"/>
+              <p:cNvSpPr/>
+              <p:nvPr/>
+            </p:nvSpPr>
+            <p:spPr>
+              <a:xfrm>
+                <a:off x="7791360" y="1900254"/>
+                <a:ext cx="972000" cy="432000"/>
+              </a:xfrm>
+              <a:prstGeom prst="rect">
+                <a:avLst/>
+              </a:prstGeom>
+              <a:solidFill>
+                <a:srgbClr val="FFF5D9"/>
+              </a:solidFill>
+              <a:ln w="28575">
+                <a:solidFill>
+                  <a:srgbClr val="0070C0"/>
+                </a:solidFill>
+              </a:ln>
+            </p:spPr>
+            <p:style>
+              <a:lnRef idx="2">
+                <a:schemeClr val="dk1"/>
+              </a:lnRef>
+              <a:fillRef idx="1">
+                <a:schemeClr val="lt1"/>
+              </a:fillRef>
+              <a:effectRef idx="0">
+                <a:schemeClr val="dk1"/>
+              </a:effectRef>
+              <a:fontRef idx="minor">
+                <a:schemeClr val="dk1"/>
+              </a:fontRef>
+            </p:style>
+            <p:txBody>
+              <a:bodyPr rtlCol="0" anchor="ctr"/>
+              <a:lstStyle/>
+              <a:p>
+                <a:pPr algn="ctr"/>
+                <a:r>
+                  <a:rPr lang="en-US" altLang="ko-KR" sz="1100" b="1" smtClean="0">
+                    <a:solidFill>
+                      <a:srgbClr val="0070C0"/>
+                    </a:solidFill>
+                  </a:rPr>
+                  <a:t>double</a:t>
+                </a:r>
+                <a:endParaRPr lang="ko-KR" altLang="en-US" sz="1100" b="1" dirty="0">
+                  <a:solidFill>
+                    <a:srgbClr val="0070C0"/>
+                  </a:solidFill>
+                </a:endParaRPr>
+              </a:p>
+            </p:txBody>
+          </p:sp>
+          <p:cxnSp>
+            <p:nvCxnSpPr>
+              <p:cNvPr id="51" name="직선 화살표 연결선 50"/>
+              <p:cNvCxnSpPr>
+                <a:stCxn id="55" idx="3"/>
+              </p:cNvCxnSpPr>
+              <p:nvPr/>
+            </p:nvCxnSpPr>
+            <p:spPr>
+              <a:xfrm>
+                <a:off x="7118948" y="2116254"/>
+                <a:ext cx="672412" cy="0"/>
+              </a:xfrm>
+              <a:prstGeom prst="straightConnector1">
+                <a:avLst/>
+              </a:prstGeom>
+              <a:ln w="38100">
+                <a:tailEnd type="triangle"/>
+              </a:ln>
+            </p:spPr>
+            <p:style>
+              <a:lnRef idx="3">
+                <a:schemeClr val="dk1"/>
+              </a:lnRef>
+              <a:fillRef idx="0">
+                <a:schemeClr val="dk1"/>
+              </a:fillRef>
+              <a:effectRef idx="2">
+                <a:schemeClr val="dk1"/>
+              </a:effectRef>
+              <a:fontRef idx="minor">
+                <a:schemeClr val="tx1"/>
+              </a:fontRef>
+            </p:style>
+          </p:cxnSp>
+          <mc:AlternateContent xmlns:mc="http://schemas.openxmlformats.org/markup-compatibility/2006">
+            <mc:Choice xmlns:a14="http://schemas.microsoft.com/office/drawing/2010/main" Requires="a14">
+              <p:sp>
+                <p:nvSpPr>
+                  <p:cNvPr id="54" name="TextBox 53"/>
+                  <p:cNvSpPr txBox="1"/>
+                  <p:nvPr/>
+                </p:nvSpPr>
+                <p:spPr>
+                  <a:xfrm>
+                    <a:off x="7338135" y="1545944"/>
+                    <a:ext cx="234038" cy="307777"/>
+                  </a:xfrm>
+                  <a:prstGeom prst="rect">
+                    <a:avLst/>
+                  </a:prstGeom>
+                  <a:noFill/>
+                </p:spPr>
+                <p:txBody>
+                  <a:bodyPr wrap="none" lIns="0" tIns="0" rIns="0" bIns="0" rtlCol="0">
+                    <a:spAutoFit/>
+                  </a:bodyPr>
+                  <a:lstStyle/>
+                  <a:p>
+                    <a:pPr/>
+                    <a14:m>
+                      <m:oMathPara xmlns:m="http://schemas.openxmlformats.org/officeDocument/2006/math">
+                        <m:oMathParaPr>
+                          <m:jc m:val="centerGroup"/>
+                        </m:oMathParaPr>
+                        <m:oMath xmlns:m="http://schemas.openxmlformats.org/officeDocument/2006/math">
+                          <m:r>
+                            <a:rPr lang="pt-BR" altLang="ko-KR" sz="2000" b="1" i="1" smtClean="0">
+                              <a:latin typeface="Cambria Math" panose="02040503050406030204" pitchFamily="18" charset="0"/>
+                            </a:rPr>
+                            <m:t>𝒇</m:t>
+                          </m:r>
+                        </m:oMath>
+                      </m:oMathPara>
+                    </a14:m>
+                    <a:endParaRPr lang="ko-KR" altLang="en-US" sz="2000" b="1">
+                      <a:latin typeface="+mn-ea"/>
+                    </a:endParaRPr>
+                  </a:p>
+                </p:txBody>
+              </p:sp>
+            </mc:Choice>
+            <mc:Fallback>
+              <p:sp>
+                <p:nvSpPr>
+                  <p:cNvPr id="54" name="TextBox 53"/>
+                  <p:cNvSpPr txBox="1">
+                    <a:spLocks noRot="1" noChangeAspect="1" noMove="1" noResize="1" noEditPoints="1" noAdjustHandles="1" noChangeArrowheads="1" noChangeShapeType="1" noTextEdit="1"/>
+                  </p:cNvSpPr>
+                  <p:nvPr/>
+                </p:nvSpPr>
+                <p:spPr>
+                  <a:xfrm>
+                    <a:off x="7338135" y="1545944"/>
+                    <a:ext cx="234038" cy="307777"/>
+                  </a:xfrm>
+                  <a:prstGeom prst="rect">
+                    <a:avLst/>
+                  </a:prstGeom>
+                  <a:blipFill rotWithShape="0">
+                    <a:blip r:embed="rId3"/>
+                    <a:stretch>
+                      <a:fillRect l="-31579" r="-34211" b="-37255"/>
+                    </a:stretch>
+                  </a:blipFill>
+                </p:spPr>
+                <p:txBody>
+                  <a:bodyPr/>
+                  <a:lstStyle/>
+                  <a:p>
+                    <a:r>
+                      <a:rPr lang="ko-KR" altLang="en-US">
+                        <a:noFill/>
+                      </a:rPr>
+                      <a:t> </a:t>
+                    </a:r>
+                  </a:p>
+                </p:txBody>
+              </p:sp>
+            </mc:Fallback>
+          </mc:AlternateContent>
+          <p:sp>
+            <p:nvSpPr>
+              <p:cNvPr id="55" name="직사각형 54"/>
+              <p:cNvSpPr/>
+              <p:nvPr/>
+            </p:nvSpPr>
+            <p:spPr>
+              <a:xfrm>
+                <a:off x="6470948" y="1936254"/>
+                <a:ext cx="648000" cy="360000"/>
+              </a:xfrm>
+              <a:prstGeom prst="rect">
+                <a:avLst/>
+              </a:prstGeom>
+              <a:solidFill>
+                <a:schemeClr val="bg1"/>
+              </a:solidFill>
+              <a:ln w="12700">
+                <a:solidFill>
+                  <a:schemeClr val="bg1">
+                    <a:lumMod val="85000"/>
+                  </a:schemeClr>
+                </a:solidFill>
+                <a:prstDash val="dash"/>
+              </a:ln>
+            </p:spPr>
+            <p:style>
+              <a:lnRef idx="2">
+                <a:schemeClr val="dk1"/>
+              </a:lnRef>
+              <a:fillRef idx="1">
+                <a:schemeClr val="lt1"/>
+              </a:fillRef>
+              <a:effectRef idx="0">
+                <a:schemeClr val="dk1"/>
+              </a:effectRef>
+              <a:fontRef idx="minor">
+                <a:schemeClr val="dk1"/>
+              </a:fontRef>
+            </p:style>
+            <p:txBody>
+              <a:bodyPr rtlCol="0" anchor="ctr"/>
+              <a:lstStyle/>
+              <a:p>
+                <a:pPr algn="ctr"/>
+                <a:r>
+                  <a:rPr lang="en-US" altLang="ko-KR" sz="1000" b="1" smtClean="0">
+                    <a:solidFill>
+                      <a:srgbClr val="0070C0"/>
+                    </a:solidFill>
+                  </a:rPr>
+                  <a:t>int</a:t>
+                </a:r>
+                <a:endParaRPr lang="ko-KR" altLang="en-US" sz="1000" b="1" dirty="0">
+                  <a:solidFill>
+                    <a:srgbClr val="0070C0"/>
+                  </a:solidFill>
+                </a:endParaRPr>
+              </a:p>
+            </p:txBody>
+          </p:sp>
+          <p:sp>
+            <p:nvSpPr>
+              <p:cNvPr id="58" name="TextBox 57"/>
+              <p:cNvSpPr txBox="1"/>
+              <p:nvPr/>
+            </p:nvSpPr>
+            <p:spPr>
+              <a:xfrm>
+                <a:off x="5443692" y="2423776"/>
+                <a:ext cx="838691" cy="261610"/>
+              </a:xfrm>
+              <a:prstGeom prst="rect">
+                <a:avLst/>
+              </a:prstGeom>
+              <a:noFill/>
+            </p:spPr>
+            <p:txBody>
+              <a:bodyPr wrap="none" rtlCol="0">
+                <a:spAutoFit/>
+              </a:bodyPr>
+              <a:lstStyle/>
+              <a:p>
+                <a:r>
+                  <a:rPr lang="en-US" altLang="ko-KR" sz="1100" b="1" smtClean="0">
+                    <a:solidFill>
+                      <a:srgbClr val="0070C0"/>
+                    </a:solidFill>
+                  </a:rPr>
+                  <a:t>Container</a:t>
+                </a:r>
+                <a:endParaRPr lang="ko-KR" altLang="en-US" sz="1100" b="1">
+                  <a:solidFill>
+                    <a:srgbClr val="0070C0"/>
+                  </a:solidFill>
+                </a:endParaRPr>
+              </a:p>
+            </p:txBody>
+          </p:sp>
+          <p:sp>
+            <p:nvSpPr>
+              <p:cNvPr id="59" name="TextBox 58"/>
+              <p:cNvSpPr txBox="1"/>
+              <p:nvPr/>
+            </p:nvSpPr>
+            <p:spPr>
+              <a:xfrm>
+                <a:off x="7858015" y="2423776"/>
+                <a:ext cx="838691" cy="261610"/>
+              </a:xfrm>
+              <a:prstGeom prst="rect">
+                <a:avLst/>
+              </a:prstGeom>
+              <a:noFill/>
+            </p:spPr>
+            <p:txBody>
+              <a:bodyPr wrap="none" rtlCol="0">
+                <a:spAutoFit/>
+              </a:bodyPr>
+              <a:lstStyle/>
+              <a:p>
+                <a:r>
+                  <a:rPr lang="en-US" altLang="ko-KR" sz="1100" b="1" smtClean="0">
+                    <a:solidFill>
+                      <a:srgbClr val="0070C0"/>
+                    </a:solidFill>
+                  </a:rPr>
+                  <a:t>Container</a:t>
+                </a:r>
+                <a:endParaRPr lang="ko-KR" altLang="en-US" sz="1100" b="1">
+                  <a:solidFill>
+                    <a:srgbClr val="0070C0"/>
+                  </a:solidFill>
+                </a:endParaRPr>
+              </a:p>
+            </p:txBody>
+          </p:sp>
+          <p:sp>
+            <p:nvSpPr>
+              <p:cNvPr id="65" name="위쪽 화살표 64"/>
+              <p:cNvSpPr/>
+              <p:nvPr/>
+            </p:nvSpPr>
+            <p:spPr>
+              <a:xfrm rot="5400000">
+                <a:off x="6240185" y="1964858"/>
+                <a:ext cx="339616" cy="302793"/>
+              </a:xfrm>
+              <a:prstGeom prst="upArrow">
+                <a:avLst>
+                  <a:gd name="adj1" fmla="val 63636"/>
+                  <a:gd name="adj2" fmla="val 59091"/>
+                </a:avLst>
+              </a:prstGeom>
+              <a:solidFill>
+                <a:srgbClr val="0070C0"/>
+              </a:solidFill>
+              <a:ln w="28575">
+                <a:solidFill>
+                  <a:schemeClr val="bg1"/>
+                </a:solidFill>
+              </a:ln>
+            </p:spPr>
+            <p:style>
+              <a:lnRef idx="2">
+                <a:schemeClr val="accent1">
+                  <a:shade val="50000"/>
+                </a:schemeClr>
+              </a:lnRef>
+              <a:fillRef idx="1">
+                <a:schemeClr val="accent1"/>
+              </a:fillRef>
+              <a:effectRef idx="0">
+                <a:schemeClr val="accent1"/>
+              </a:effectRef>
+              <a:fontRef idx="minor">
+                <a:schemeClr val="lt1"/>
+              </a:fontRef>
+            </p:style>
+            <p:txBody>
+              <a:bodyPr rtlCol="0" anchor="ctr"/>
+              <a:lstStyle/>
+              <a:p>
+                <a:pPr algn="ctr"/>
+                <a:endParaRPr lang="ko-KR" altLang="en-US" sz="1400"/>
+              </a:p>
+            </p:txBody>
+          </p:sp>
+        </p:grpSp>
+      </p:grpSp>
+      <p:grpSp>
+        <p:nvGrpSpPr>
+          <p:cNvPr id="30" name="그룹 29"/>
+          <p:cNvGrpSpPr/>
+          <p:nvPr/>
+        </p:nvGrpSpPr>
+        <p:grpSpPr>
+          <a:xfrm>
+            <a:off x="6316671" y="4224117"/>
+            <a:ext cx="3180871" cy="1622977"/>
+            <a:chOff x="6672157" y="3681606"/>
+            <a:chExt cx="3180871" cy="1622977"/>
+          </a:xfrm>
+        </p:grpSpPr>
+        <p:sp>
+          <p:nvSpPr>
+            <p:cNvPr id="67" name="직사각형 66"/>
+            <p:cNvSpPr/>
+            <p:nvPr/>
+          </p:nvSpPr>
+          <p:spPr>
+            <a:xfrm>
+              <a:off x="8099932" y="4767215"/>
+              <a:ext cx="430823" cy="537368"/>
+            </a:xfrm>
+            <a:prstGeom prst="rect">
+              <a:avLst/>
+            </a:prstGeom>
+            <a:solidFill>
+              <a:schemeClr val="accent4">
+                <a:lumMod val="20000"/>
+                <a:lumOff val="80000"/>
+              </a:schemeClr>
+            </a:solidFill>
+            <a:ln>
+              <a:solidFill>
+                <a:schemeClr val="accent4">
+                  <a:lumMod val="20000"/>
+                  <a:lumOff val="80000"/>
+                </a:schemeClr>
+              </a:solidFill>
+            </a:ln>
+          </p:spPr>
+          <p:style>
+            <a:lnRef idx="2">
+              <a:schemeClr val="accent1">
+                <a:shade val="50000"/>
+              </a:schemeClr>
+            </a:lnRef>
+            <a:fillRef idx="1">
+              <a:schemeClr val="accent1"/>
+            </a:fillRef>
+            <a:effectRef idx="0">
+              <a:schemeClr val="accent1"/>
+            </a:effectRef>
+            <a:fontRef idx="minor">
+              <a:schemeClr val="lt1"/>
+            </a:fontRef>
+          </p:style>
+          <p:txBody>
+            <a:bodyPr rtlCol="0" anchor="ctr"/>
+            <a:lstStyle/>
+            <a:p>
+              <a:pPr algn="ctr"/>
+              <a:endParaRPr lang="ko-KR" altLang="en-US" sz="1400"/>
+            </a:p>
+          </p:txBody>
+        </p:sp>
+        <p:sp>
+          <p:nvSpPr>
+            <p:cNvPr id="64" name="TextBox 63"/>
+            <p:cNvSpPr txBox="1"/>
+            <p:nvPr/>
+          </p:nvSpPr>
+          <p:spPr>
+            <a:xfrm>
+              <a:off x="6672157" y="3681606"/>
+              <a:ext cx="3180871" cy="1523494"/>
+            </a:xfrm>
+            <a:prstGeom prst="rect">
+              <a:avLst/>
+            </a:prstGeom>
+            <a:noFill/>
+          </p:spPr>
+          <p:txBody>
+            <a:bodyPr wrap="none" rtlCol="0">
+              <a:spAutoFit/>
+            </a:bodyPr>
+            <a:lstStyle/>
+            <a:p>
+              <a:pPr>
+                <a:lnSpc>
+                  <a:spcPct val="150000"/>
+                </a:lnSpc>
+              </a:pPr>
+              <a:r>
+                <a:rPr lang="en-US" altLang="ko-KR" sz="1100" b="1" smtClean="0">
+                  <a:solidFill>
+                    <a:srgbClr val="0070C0"/>
+                  </a:solidFill>
+                </a:rPr>
+                <a:t>A&lt;</a:t>
+              </a:r>
+              <a:r>
+                <a:rPr lang="en-US" altLang="ko-KR" sz="1100" b="1" smtClean="0"/>
+                <a:t>double</a:t>
+              </a:r>
+              <a:r>
+                <a:rPr lang="en-US" altLang="ko-KR" sz="1100" b="1" dirty="0" smtClean="0">
+                  <a:solidFill>
+                    <a:srgbClr val="0070C0"/>
+                  </a:solidFill>
+                </a:rPr>
+                <a:t>&gt;</a:t>
+              </a:r>
+              <a:r>
+                <a:rPr lang="en-US" altLang="ko-KR" sz="1100" dirty="0" smtClean="0"/>
+                <a:t> </a:t>
+              </a:r>
+              <a:r>
+                <a:rPr lang="en-US" altLang="ko-KR" sz="1600" b="1" dirty="0" smtClean="0"/>
+                <a:t>f</a:t>
+              </a:r>
+              <a:r>
+                <a:rPr lang="en-US" altLang="ko-KR" sz="1100" dirty="0" smtClean="0"/>
+                <a:t>(</a:t>
+              </a:r>
+              <a:r>
+                <a:rPr lang="en-US" altLang="ko-KR" sz="1100" b="1" dirty="0" err="1" smtClean="0"/>
+                <a:t>int</a:t>
+              </a:r>
+              <a:r>
+                <a:rPr lang="en-US" altLang="ko-KR" sz="1100" dirty="0" smtClean="0"/>
+                <a:t> value)</a:t>
+              </a:r>
+            </a:p>
+            <a:p>
+              <a:r>
+                <a:rPr lang="en-US" altLang="ko-KR" sz="1100" dirty="0" smtClean="0"/>
+                <a:t>{</a:t>
+              </a:r>
+            </a:p>
+            <a:p>
+              <a:r>
+                <a:rPr lang="en-US" altLang="ko-KR" sz="1100" dirty="0" smtClean="0"/>
+                <a:t>      …</a:t>
+              </a:r>
+            </a:p>
+            <a:p>
+              <a:r>
+                <a:rPr lang="en-US" altLang="ko-KR" sz="1100" dirty="0" smtClean="0"/>
+                <a:t>}</a:t>
+              </a:r>
+            </a:p>
+            <a:p>
+              <a:endParaRPr lang="en-US" altLang="ko-KR" sz="1100" smtClean="0"/>
+            </a:p>
+            <a:p>
+              <a:r>
+                <a:rPr lang="en-US" altLang="ko-KR" sz="1100" b="1" smtClean="0">
+                  <a:solidFill>
+                    <a:srgbClr val="0070C0"/>
+                  </a:solidFill>
+                </a:rPr>
+                <a:t>A&lt;</a:t>
+              </a:r>
+              <a:r>
+                <a:rPr lang="en-US" altLang="ko-KR" sz="1100" smtClean="0"/>
+                <a:t>int</a:t>
+              </a:r>
+              <a:r>
+                <a:rPr lang="en-US" altLang="ko-KR" sz="1100" b="1" smtClean="0">
+                  <a:solidFill>
+                    <a:srgbClr val="0070C0"/>
+                  </a:solidFill>
+                </a:rPr>
+                <a:t>&gt;</a:t>
+              </a:r>
+              <a:r>
+                <a:rPr lang="en-US" altLang="ko-KR" sz="1100" smtClean="0"/>
+                <a:t> xzy = …;</a:t>
+              </a:r>
+              <a:endParaRPr lang="en-US" altLang="ko-KR" sz="1100" dirty="0"/>
+            </a:p>
+            <a:p>
+              <a:r>
+                <a:rPr lang="en-US" altLang="ko-KR" sz="1100" b="1" smtClean="0">
+                  <a:solidFill>
+                    <a:srgbClr val="0070C0"/>
+                  </a:solidFill>
+                </a:rPr>
+                <a:t>A&lt;</a:t>
+              </a:r>
+              <a:r>
+                <a:rPr lang="en-US" altLang="ko-KR" sz="1100" smtClean="0"/>
+                <a:t>double</a:t>
+              </a:r>
+              <a:r>
+                <a:rPr lang="en-US" altLang="ko-KR" sz="1100" b="1" smtClean="0">
+                  <a:solidFill>
+                    <a:srgbClr val="0070C0"/>
+                  </a:solidFill>
+                </a:rPr>
+                <a:t>&gt;</a:t>
+              </a:r>
+              <a:r>
+                <a:rPr lang="en-US" altLang="ko-KR" sz="1100" smtClean="0"/>
+                <a:t> ret = xyz.</a:t>
+              </a:r>
+              <a:r>
+                <a:rPr lang="en-US" altLang="ko-KR" sz="1100" b="1" smtClean="0">
+                  <a:solidFill>
+                    <a:srgbClr val="C00000"/>
+                  </a:solidFill>
+                </a:rPr>
+                <a:t>Bind</a:t>
+              </a:r>
+              <a:r>
+                <a:rPr lang="en-US" altLang="ko-KR" sz="1100" smtClean="0"/>
+                <a:t>(value </a:t>
+              </a:r>
+              <a:r>
+                <a:rPr lang="en-US" altLang="ko-KR" sz="1100" dirty="0" smtClean="0"/>
+                <a:t>=&gt;</a:t>
+              </a:r>
+              <a:r>
+                <a:rPr lang="en-US" altLang="ko-KR" sz="1200" dirty="0" smtClean="0"/>
+                <a:t> </a:t>
+              </a:r>
+              <a:r>
+                <a:rPr lang="en-US" altLang="ko-KR" sz="1200" b="1" dirty="0" smtClean="0"/>
+                <a:t>f</a:t>
+              </a:r>
+              <a:r>
+                <a:rPr lang="en-US" altLang="ko-KR" sz="1100" dirty="0" smtClean="0"/>
+                <a:t>(value));</a:t>
+              </a:r>
+              <a:endParaRPr lang="ko-KR" altLang="en-US" sz="1200" dirty="0"/>
+            </a:p>
+          </p:txBody>
+        </p:sp>
+      </p:grpSp>
+      <p:sp>
+        <p:nvSpPr>
+          <p:cNvPr id="79" name="TextBox 78"/>
+          <p:cNvSpPr txBox="1"/>
+          <p:nvPr/>
+        </p:nvSpPr>
+        <p:spPr>
+          <a:xfrm>
+            <a:off x="9836414" y="2005217"/>
+            <a:ext cx="364202" cy="246221"/>
+          </a:xfrm>
+          <a:prstGeom prst="rect">
+            <a:avLst/>
+          </a:prstGeom>
+          <a:noFill/>
+        </p:spPr>
+        <p:txBody>
+          <a:bodyPr wrap="none" rtlCol="0">
+            <a:spAutoFit/>
+          </a:bodyPr>
+          <a:lstStyle/>
+          <a:p>
+            <a:r>
+              <a:rPr lang="en-US" altLang="ko-KR" sz="1000" b="1" i="1" smtClean="0">
+                <a:solidFill>
+                  <a:srgbClr val="C00000"/>
+                </a:solidFill>
+              </a:rPr>
+              <a:t>Vs.</a:t>
+            </a:r>
+            <a:endParaRPr lang="ko-KR" altLang="en-US" sz="1000" b="1" i="1">
+              <a:solidFill>
+                <a:srgbClr val="C00000"/>
+              </a:solidFill>
+            </a:endParaRPr>
+          </a:p>
+        </p:txBody>
+      </p:sp>
+      <p:grpSp>
+        <p:nvGrpSpPr>
+          <p:cNvPr id="23" name="그룹 22"/>
+          <p:cNvGrpSpPr/>
+          <p:nvPr/>
+        </p:nvGrpSpPr>
+        <p:grpSpPr>
+          <a:xfrm>
+            <a:off x="10436760" y="1010907"/>
+            <a:ext cx="1380885" cy="2887817"/>
+            <a:chOff x="10038178" y="1031101"/>
+            <a:chExt cx="1380885" cy="2887817"/>
+          </a:xfrm>
+        </p:grpSpPr>
+        <p:sp>
+          <p:nvSpPr>
+            <p:cNvPr id="72" name="직사각형 71"/>
+            <p:cNvSpPr/>
+            <p:nvPr/>
+          </p:nvSpPr>
+          <p:spPr>
+            <a:xfrm>
+              <a:off x="10038178" y="1900253"/>
+              <a:ext cx="972000" cy="432000"/>
+            </a:xfrm>
+            <a:prstGeom prst="rect">
+              <a:avLst/>
+            </a:prstGeom>
+            <a:solidFill>
+              <a:srgbClr val="FFF5D9"/>
+            </a:solidFill>
+            <a:ln w="28575">
+              <a:solidFill>
+                <a:srgbClr val="0070C0"/>
+              </a:solidFill>
+            </a:ln>
+          </p:spPr>
+          <p:style>
+            <a:lnRef idx="2">
+              <a:schemeClr val="dk1"/>
+            </a:lnRef>
+            <a:fillRef idx="1">
+              <a:schemeClr val="lt1"/>
+            </a:fillRef>
+            <a:effectRef idx="0">
+              <a:schemeClr val="dk1"/>
+            </a:effectRef>
+            <a:fontRef idx="minor">
+              <a:schemeClr val="dk1"/>
+            </a:fontRef>
+          </p:style>
+          <p:txBody>
+            <a:bodyPr rtlCol="0" anchor="ctr"/>
+            <a:lstStyle/>
+            <a:p>
+              <a:pPr algn="ctr"/>
+              <a:r>
+                <a:rPr lang="en-US" altLang="ko-KR" sz="1100" b="1" smtClean="0">
+                  <a:solidFill>
+                    <a:srgbClr val="0070C0"/>
+                  </a:solidFill>
+                </a:rPr>
+                <a:t>int</a:t>
+              </a:r>
+              <a:endParaRPr lang="ko-KR" altLang="en-US" sz="1100" b="1" dirty="0">
+                <a:solidFill>
+                  <a:srgbClr val="0070C0"/>
+                </a:solidFill>
+              </a:endParaRPr>
+            </a:p>
+          </p:txBody>
+        </p:sp>
+        <p:cxnSp>
+          <p:nvCxnSpPr>
+            <p:cNvPr id="73" name="직선 화살표 연결선 72"/>
+            <p:cNvCxnSpPr>
+              <a:stCxn id="75" idx="0"/>
+              <a:endCxn id="72" idx="2"/>
+            </p:cNvCxnSpPr>
+            <p:nvPr/>
+          </p:nvCxnSpPr>
+          <p:spPr>
+            <a:xfrm flipV="1">
+              <a:off x="10517026" y="2332253"/>
+              <a:ext cx="7152" cy="1226665"/>
+            </a:xfrm>
+            <a:prstGeom prst="straightConnector1">
+              <a:avLst/>
+            </a:prstGeom>
+            <a:ln w="38100">
+              <a:tailEnd type="triangle"/>
+            </a:ln>
+          </p:spPr>
+          <p:style>
+            <a:lnRef idx="3">
+              <a:schemeClr val="dk1"/>
+            </a:lnRef>
+            <a:fillRef idx="0">
+              <a:schemeClr val="dk1"/>
+            </a:fillRef>
+            <a:effectRef idx="2">
+              <a:schemeClr val="dk1"/>
+            </a:effectRef>
+            <a:fontRef idx="minor">
+              <a:schemeClr val="tx1"/>
+            </a:fontRef>
+          </p:style>
+        </p:cxnSp>
+        <p:sp>
+          <p:nvSpPr>
+            <p:cNvPr id="75" name="직사각형 74"/>
+            <p:cNvSpPr/>
+            <p:nvPr/>
+          </p:nvSpPr>
+          <p:spPr>
+            <a:xfrm>
+              <a:off x="10193026" y="3558918"/>
+              <a:ext cx="648000" cy="360000"/>
+            </a:xfrm>
+            <a:prstGeom prst="rect">
+              <a:avLst/>
+            </a:prstGeom>
+            <a:solidFill>
+              <a:schemeClr val="bg1"/>
+            </a:solidFill>
+            <a:ln w="12700">
+              <a:solidFill>
+                <a:schemeClr val="bg1">
+                  <a:lumMod val="85000"/>
+                </a:schemeClr>
+              </a:solidFill>
+              <a:prstDash val="dash"/>
+            </a:ln>
+          </p:spPr>
+          <p:style>
+            <a:lnRef idx="2">
+              <a:schemeClr val="dk1"/>
+            </a:lnRef>
+            <a:fillRef idx="1">
+              <a:schemeClr val="lt1"/>
+            </a:fillRef>
+            <a:effectRef idx="0">
+              <a:schemeClr val="dk1"/>
+            </a:effectRef>
+            <a:fontRef idx="minor">
+              <a:schemeClr val="dk1"/>
+            </a:fontRef>
+          </p:style>
+          <p:txBody>
+            <a:bodyPr rtlCol="0" anchor="ctr"/>
+            <a:lstStyle/>
+            <a:p>
+              <a:pPr algn="ctr"/>
+              <a:r>
+                <a:rPr lang="en-US" altLang="ko-KR" sz="1000" b="1" smtClean="0">
+                  <a:solidFill>
+                    <a:srgbClr val="0070C0"/>
+                  </a:solidFill>
+                </a:rPr>
+                <a:t>int</a:t>
+              </a:r>
+              <a:endParaRPr lang="ko-KR" altLang="en-US" sz="1000" b="1" dirty="0">
+                <a:solidFill>
+                  <a:srgbClr val="0070C0"/>
+                </a:solidFill>
+              </a:endParaRPr>
+            </a:p>
+          </p:txBody>
+        </p:sp>
+        <p:sp>
+          <p:nvSpPr>
+            <p:cNvPr id="77" name="TextBox 76"/>
+            <p:cNvSpPr txBox="1"/>
+            <p:nvPr/>
+          </p:nvSpPr>
+          <p:spPr>
+            <a:xfrm>
+              <a:off x="10580372" y="2423776"/>
+              <a:ext cx="838691" cy="261610"/>
+            </a:xfrm>
+            <a:prstGeom prst="rect">
+              <a:avLst/>
+            </a:prstGeom>
+            <a:noFill/>
+          </p:spPr>
+          <p:txBody>
+            <a:bodyPr wrap="none" rtlCol="0">
+              <a:spAutoFit/>
+            </a:bodyPr>
+            <a:lstStyle/>
+            <a:p>
+              <a:r>
+                <a:rPr lang="en-US" altLang="ko-KR" sz="1100" b="1" smtClean="0">
+                  <a:solidFill>
+                    <a:srgbClr val="0070C0"/>
+                  </a:solidFill>
+                </a:rPr>
+                <a:t>Container</a:t>
+              </a:r>
+              <a:endParaRPr lang="ko-KR" altLang="en-US" sz="1100" b="1">
+                <a:solidFill>
+                  <a:srgbClr val="0070C0"/>
+                </a:solidFill>
+              </a:endParaRPr>
+            </a:p>
+          </p:txBody>
+        </p:sp>
+        <p:sp>
+          <p:nvSpPr>
+            <p:cNvPr id="80" name="TextBox 79"/>
+            <p:cNvSpPr txBox="1"/>
+            <p:nvPr/>
+          </p:nvSpPr>
+          <p:spPr>
+            <a:xfrm>
+              <a:off x="10058054" y="1031101"/>
+              <a:ext cx="917944" cy="369332"/>
+            </a:xfrm>
+            <a:prstGeom prst="rect">
+              <a:avLst/>
+            </a:prstGeom>
+            <a:noFill/>
+          </p:spPr>
+          <p:txBody>
+            <a:bodyPr wrap="none" rtlCol="0">
+              <a:spAutoFit/>
+            </a:bodyPr>
+            <a:lstStyle/>
+            <a:p>
+              <a:r>
+                <a:rPr lang="en-US" altLang="ko-KR" b="1" smtClean="0"/>
+                <a:t>Return</a:t>
+              </a:r>
+              <a:endParaRPr lang="ko-KR" altLang="en-US" b="1"/>
+            </a:p>
+          </p:txBody>
+        </p:sp>
+      </p:grpSp>
+      <p:sp>
+        <p:nvSpPr>
+          <p:cNvPr id="31" name="TextBox 30"/>
+          <p:cNvSpPr txBox="1"/>
+          <p:nvPr/>
+        </p:nvSpPr>
+        <p:spPr>
+          <a:xfrm>
+            <a:off x="266700" y="3200226"/>
+            <a:ext cx="1106393" cy="253916"/>
+          </a:xfrm>
+          <a:prstGeom prst="rect">
+            <a:avLst/>
+          </a:prstGeom>
+          <a:noFill/>
+        </p:spPr>
+        <p:txBody>
+          <a:bodyPr wrap="none" rtlCol="0">
+            <a:spAutoFit/>
+          </a:bodyPr>
+          <a:lstStyle/>
+          <a:p>
+            <a:r>
+              <a:rPr lang="en-US" altLang="ko-KR" sz="1050" b="1" smtClean="0"/>
+              <a:t>Normal World</a:t>
+            </a:r>
+            <a:endParaRPr lang="ko-KR" altLang="en-US" sz="1050" b="1"/>
+          </a:p>
+        </p:txBody>
+      </p:sp>
+      <p:sp>
+        <p:nvSpPr>
+          <p:cNvPr id="81" name="TextBox 80"/>
+          <p:cNvSpPr txBox="1"/>
+          <p:nvPr/>
+        </p:nvSpPr>
+        <p:spPr>
+          <a:xfrm>
+            <a:off x="266700" y="2834687"/>
+            <a:ext cx="2180405" cy="253916"/>
+          </a:xfrm>
+          <a:prstGeom prst="rect">
+            <a:avLst/>
+          </a:prstGeom>
+          <a:noFill/>
+        </p:spPr>
+        <p:txBody>
+          <a:bodyPr wrap="none" rtlCol="0">
+            <a:spAutoFit/>
+          </a:bodyPr>
+          <a:lstStyle/>
+          <a:p>
+            <a:r>
+              <a:rPr lang="en-US" altLang="ko-KR" sz="1050" b="1" smtClean="0"/>
+              <a:t>Elevated World : </a:t>
+            </a:r>
+            <a:r>
+              <a:rPr lang="en-US" altLang="ko-KR" sz="1050" b="1" smtClean="0">
+                <a:solidFill>
+                  <a:srgbClr val="C00000"/>
+                </a:solidFill>
+              </a:rPr>
+              <a:t>Containerized</a:t>
+            </a:r>
+            <a:endParaRPr lang="ko-KR" altLang="en-US" sz="1050" b="1">
+              <a:solidFill>
+                <a:srgbClr val="C00000"/>
+              </a:solidFill>
+            </a:endParaRPr>
+          </a:p>
+        </p:txBody>
+      </p:sp>
+    </p:spTree>
+    <p:extLst>
+      <p:ext uri="{BB962C8B-B14F-4D97-AF65-F5344CB8AC3E}">
+        <p14:creationId xmlns:p14="http://schemas.microsoft.com/office/powerpoint/2010/main" val="631537639"/>
       </p:ext>
     </p:extLst>
   </p:cSld>

</xml_diff>